<commit_message>
Added first four requirements
</commit_message>
<xml_diff>
--- a/CMQA/Presentations/Nate Slides/Nate Slides.pptx
+++ b/CMQA/Presentations/Nate Slides/Nate Slides.pptx
@@ -6,6 +6,9 @@
   </p:sldMasterIdLst>
   <p:sldIdLst>
     <p:sldId id="257" r:id="rId2"/>
+    <p:sldId id="258" r:id="rId3"/>
+    <p:sldId id="259" r:id="rId4"/>
+    <p:sldId id="260" r:id="rId5"/>
   </p:sldIdLst>
   <p:sldSz cx="9144000" cy="6858000" type="screen4x3"/>
   <p:notesSz cx="6858000" cy="9144000"/>
@@ -3114,7 +3117,7 @@
           <a:p>
             <a:r>
               <a:rPr lang="en-US" i="1" dirty="0" smtClean="0"/>
-              <a:t>Requirement Number</a:t>
+              <a:t>RCL.PL.THM1</a:t>
             </a:r>
             <a:endParaRPr lang="en-US" i="1" dirty="0"/>
           </a:p>
@@ -3130,14 +3133,14 @@
             <p:ph idx="1"/>
             <p:extLst>
               <p:ext uri="{D42A27DB-BD31-4B8C-83A1-F6EECF244321}">
-                <p14:modId xmlns:p14="http://schemas.microsoft.com/office/powerpoint/2010/main" val="1483644448"/>
+                <p14:modId xmlns:p14="http://schemas.microsoft.com/office/powerpoint/2010/main" val="878666631"/>
               </p:ext>
             </p:extLst>
           </p:nvPr>
         </p:nvGraphicFramePr>
         <p:xfrm>
           <a:off x="457200" y="1371600"/>
-          <a:ext cx="8229600" cy="1112520"/>
+          <a:ext cx="8229600" cy="1656080"/>
         </p:xfrm>
         <a:graphic>
           <a:graphicData uri="http://schemas.openxmlformats.org/drawingml/2006/table">
@@ -3161,15 +3164,7 @@
                             <a:schemeClr val="bg1"/>
                           </a:solidFill>
                         </a:rPr>
-                        <a:t> RVM Requirement </a:t>
-                      </a:r>
-                      <a:r>
-                        <a:rPr lang="en-US" b="0" dirty="0" smtClean="0">
-                          <a:solidFill>
-                            <a:schemeClr val="bg1"/>
-                          </a:solidFill>
-                        </a:rPr>
-                        <a:t>Number</a:t>
+                        <a:t> RVM Requirement Number</a:t>
                       </a:r>
                       <a:endParaRPr lang="en-US" b="0" dirty="0">
                         <a:solidFill>
@@ -3233,7 +3228,7 @@
                             <a:schemeClr val="tx1"/>
                           </a:solidFill>
                         </a:rPr>
-                        <a:t>1   (Section 3.0)</a:t>
+                        <a:t>1</a:t>
                       </a:r>
                       <a:endParaRPr lang="en-US" b="1" dirty="0">
                         <a:solidFill>
@@ -3308,15 +3303,7 @@
                             <a:schemeClr val="bg1"/>
                           </a:solidFill>
                         </a:rPr>
-                        <a:t>Requirement </a:t>
-                      </a:r>
-                      <a:r>
-                        <a:rPr lang="en-US" b="0" baseline="0" dirty="0" smtClean="0">
-                          <a:solidFill>
-                            <a:schemeClr val="bg1"/>
-                          </a:solidFill>
-                        </a:rPr>
-                        <a:t>Wording</a:t>
+                        <a:t>Requirement Wording</a:t>
                       </a:r>
                       <a:endParaRPr lang="en-US" b="0" dirty="0">
                         <a:solidFill>
@@ -3380,23 +3367,23 @@
                             <a:schemeClr val="tx1"/>
                           </a:solidFill>
                         </a:rPr>
-                        <a:t>“</a:t>
+                        <a:t>All </a:t>
                       </a:r>
                       <a:r>
-                        <a:rPr lang="en-US" b="1" i="1" dirty="0" smtClean="0">
+                        <a:rPr lang="en-US" b="1" dirty="0" err="1" smtClean="0">
                           <a:solidFill>
                             <a:schemeClr val="tx1"/>
                           </a:solidFill>
                         </a:rPr>
-                        <a:t>Word</a:t>
+                        <a:t>CubeSat</a:t>
                       </a:r>
                       <a:r>
-                        <a:rPr lang="en-US" b="1" i="1" baseline="0" dirty="0" smtClean="0">
+                        <a:rPr lang="en-US" b="1" dirty="0" smtClean="0">
                           <a:solidFill>
                             <a:schemeClr val="tx1"/>
                           </a:solidFill>
                         </a:rPr>
-                        <a:t> for word Requirement”</a:t>
+                        <a:t> components shall be rated to withstand a temperature range of at least -20 ⁰C to 70 ⁰C</a:t>
                       </a:r>
                       <a:endParaRPr lang="en-US" b="1" dirty="0">
                         <a:solidFill>
@@ -3527,31 +3514,7 @@
                             <a:schemeClr val="tx1"/>
                           </a:solidFill>
                         </a:rPr>
-                        <a:t>Test,</a:t>
-                      </a:r>
-                      <a:r>
-                        <a:rPr lang="en-US" b="1" i="1" baseline="0" dirty="0" smtClean="0">
-                          <a:solidFill>
-                            <a:schemeClr val="tx1"/>
-                          </a:solidFill>
-                        </a:rPr>
-                        <a:t> Analyze, Examine, </a:t>
-                      </a:r>
-                      <a:r>
-                        <a:rPr lang="en-US" b="1" i="0" baseline="0" dirty="0" smtClean="0">
-                          <a:solidFill>
-                            <a:schemeClr val="tx1"/>
-                          </a:solidFill>
-                        </a:rPr>
-                        <a:t>or</a:t>
-                      </a:r>
-                      <a:r>
-                        <a:rPr lang="en-US" b="1" i="1" baseline="0" dirty="0" smtClean="0">
-                          <a:solidFill>
-                            <a:schemeClr val="tx1"/>
-                          </a:solidFill>
-                        </a:rPr>
-                        <a:t> Demo</a:t>
+                        <a:t>Analysis</a:t>
                       </a:r>
                       <a:endParaRPr lang="en-US" b="1" i="1" dirty="0">
                         <a:solidFill>
@@ -3619,7 +3582,7 @@
         <p:spPr>
           <a:xfrm>
             <a:off x="381000" y="3676471"/>
-            <a:ext cx="8305800" cy="830997"/>
+            <a:ext cx="8305800" cy="1200329"/>
           </a:xfrm>
           <a:prstGeom prst="rect">
             <a:avLst/>
@@ -3633,8 +3596,12 @@
           <a:lstStyle/>
           <a:p>
             <a:r>
-              <a:rPr lang="en-US" sz="2400" b="1" i="1" dirty="0" smtClean="0"/>
-              <a:t>Sentence summary of any terms that need explaining. Also include images, where necessary</a:t>
+              <a:rPr lang="en-US" sz="2400" dirty="0" smtClean="0"/>
+              <a:t>For </a:t>
+            </a:r>
+            <a:r>
+              <a:rPr lang="en-US" sz="2400" dirty="0"/>
+              <a:t>those components that are developed at the SSRL, each component that is used in its assembly will be rated to operate within said range.</a:t>
             </a:r>
             <a:endParaRPr lang="en-US" sz="2400" b="1" i="1" dirty="0"/>
           </a:p>
@@ -3650,6 +3617,1730 @@
   <p:clrMapOvr>
     <a:masterClrMapping/>
   </p:clrMapOvr>
+  <p:timing>
+    <p:tnLst>
+      <p:par>
+        <p:cTn id="1" dur="indefinite" restart="never" nodeType="tmRoot"/>
+      </p:par>
+    </p:tnLst>
+  </p:timing>
+</p:sld>
+</file>
+
+<file path=ppt/slides/slide2.xml><?xml version="1.0" encoding="utf-8"?>
+<p:sld xmlns:a="http://schemas.openxmlformats.org/drawingml/2006/main" xmlns:r="http://schemas.openxmlformats.org/officeDocument/2006/relationships" xmlns:p="http://schemas.openxmlformats.org/presentationml/2006/main">
+  <p:cSld>
+    <p:spTree>
+      <p:nvGrpSpPr>
+        <p:cNvPr id="1" name=""/>
+        <p:cNvGrpSpPr/>
+        <p:nvPr/>
+      </p:nvGrpSpPr>
+      <p:grpSpPr>
+        <a:xfrm>
+          <a:off x="0" y="0"/>
+          <a:ext cx="0" cy="0"/>
+          <a:chOff x="0" y="0"/>
+          <a:chExt cx="0" cy="0"/>
+        </a:xfrm>
+      </p:grpSpPr>
+      <p:sp>
+        <p:nvSpPr>
+          <p:cNvPr id="2" name="Title 1"/>
+          <p:cNvSpPr>
+            <a:spLocks noGrp="1"/>
+          </p:cNvSpPr>
+          <p:nvPr>
+            <p:ph type="title"/>
+          </p:nvPr>
+        </p:nvSpPr>
+        <p:spPr/>
+        <p:txBody>
+          <a:bodyPr>
+            <a:normAutofit/>
+          </a:bodyPr>
+          <a:lstStyle/>
+          <a:p>
+            <a:r>
+              <a:rPr lang="en-US" i="1" dirty="0" smtClean="0"/>
+              <a:t>RCL.PL.PRP2</a:t>
+            </a:r>
+            <a:endParaRPr lang="en-US" i="1" dirty="0"/>
+          </a:p>
+        </p:txBody>
+      </p:sp>
+      <p:graphicFrame>
+        <p:nvGraphicFramePr>
+          <p:cNvPr id="4" name="Content Placeholder 3"/>
+          <p:cNvGraphicFramePr>
+            <a:graphicFrameLocks noGrp="1"/>
+          </p:cNvGraphicFramePr>
+          <p:nvPr>
+            <p:ph idx="1"/>
+            <p:extLst>
+              <p:ext uri="{D42A27DB-BD31-4B8C-83A1-F6EECF244321}">
+                <p14:modId xmlns:p14="http://schemas.microsoft.com/office/powerpoint/2010/main" val="3916922255"/>
+              </p:ext>
+            </p:extLst>
+          </p:nvPr>
+        </p:nvGraphicFramePr>
+        <p:xfrm>
+          <a:off x="457200" y="1371600"/>
+          <a:ext cx="8229600" cy="1656080"/>
+        </p:xfrm>
+        <a:graphic>
+          <a:graphicData uri="http://schemas.openxmlformats.org/drawingml/2006/table">
+            <a:tbl>
+              <a:tblPr firstRow="1" bandRow="1">
+                <a:tableStyleId>{5C22544A-7EE6-4342-B048-85BDC9FD1C3A}</a:tableStyleId>
+              </a:tblPr>
+              <a:tblGrid>
+                <a:gridCol w="3200400"/>
+                <a:gridCol w="5029200"/>
+              </a:tblGrid>
+              <a:tr h="370840">
+                <a:tc>
+                  <a:txBody>
+                    <a:bodyPr/>
+                    <a:lstStyle/>
+                    <a:p>
+                      <a:r>
+                        <a:rPr lang="en-US" b="0" dirty="0" smtClean="0">
+                          <a:solidFill>
+                            <a:schemeClr val="bg1"/>
+                          </a:solidFill>
+                        </a:rPr>
+                        <a:t> RVM Requirement Number</a:t>
+                      </a:r>
+                      <a:endParaRPr lang="en-US" b="0" dirty="0">
+                        <a:solidFill>
+                          <a:schemeClr val="bg1"/>
+                        </a:solidFill>
+                      </a:endParaRPr>
+                    </a:p>
+                  </a:txBody>
+                  <a:tcPr anchor="ctr">
+                    <a:lnL w="12700" cap="flat" cmpd="sng" algn="ctr">
+                      <a:solidFill>
+                        <a:schemeClr val="tx1"/>
+                      </a:solidFill>
+                      <a:prstDash val="solid"/>
+                      <a:round/>
+                      <a:headEnd type="none" w="med" len="med"/>
+                      <a:tailEnd type="none" w="med" len="med"/>
+                    </a:lnL>
+                    <a:lnR w="12700" cap="flat" cmpd="sng" algn="ctr">
+                      <a:solidFill>
+                        <a:schemeClr val="tx1"/>
+                      </a:solidFill>
+                      <a:prstDash val="solid"/>
+                      <a:round/>
+                      <a:headEnd type="none" w="med" len="med"/>
+                      <a:tailEnd type="none" w="med" len="med"/>
+                    </a:lnR>
+                    <a:lnT w="12700" cap="flat" cmpd="sng" algn="ctr">
+                      <a:solidFill>
+                        <a:schemeClr val="tx1"/>
+                      </a:solidFill>
+                      <a:prstDash val="solid"/>
+                      <a:round/>
+                      <a:headEnd type="none" w="med" len="med"/>
+                      <a:tailEnd type="none" w="med" len="med"/>
+                    </a:lnT>
+                    <a:lnB w="12700" cap="flat" cmpd="sng" algn="ctr">
+                      <a:solidFill>
+                        <a:schemeClr val="tx1"/>
+                      </a:solidFill>
+                      <a:prstDash val="solid"/>
+                      <a:round/>
+                      <a:headEnd type="none" w="med" len="med"/>
+                      <a:tailEnd type="none" w="med" len="med"/>
+                    </a:lnB>
+                    <a:solidFill>
+                      <a:schemeClr val="tx2">
+                        <a:lumMod val="75000"/>
+                      </a:schemeClr>
+                    </a:solidFill>
+                  </a:tcPr>
+                </a:tc>
+                <a:tc>
+                  <a:txBody>
+                    <a:bodyPr/>
+                    <a:lstStyle/>
+                    <a:p>
+                      <a:r>
+                        <a:rPr lang="en-US" b="1" dirty="0" smtClean="0">
+                          <a:solidFill>
+                            <a:schemeClr val="tx1"/>
+                          </a:solidFill>
+                        </a:rPr>
+                        <a:t>2</a:t>
+                      </a:r>
+                      <a:endParaRPr lang="en-US" b="1" dirty="0">
+                        <a:solidFill>
+                          <a:schemeClr val="tx1"/>
+                        </a:solidFill>
+                      </a:endParaRPr>
+                    </a:p>
+                  </a:txBody>
+                  <a:tcPr>
+                    <a:lnL w="12700" cap="flat" cmpd="sng" algn="ctr">
+                      <a:solidFill>
+                        <a:schemeClr val="tx1"/>
+                      </a:solidFill>
+                      <a:prstDash val="solid"/>
+                      <a:round/>
+                      <a:headEnd type="none" w="med" len="med"/>
+                      <a:tailEnd type="none" w="med" len="med"/>
+                    </a:lnL>
+                    <a:lnR w="12700" cap="flat" cmpd="sng" algn="ctr">
+                      <a:solidFill>
+                        <a:schemeClr val="tx1"/>
+                      </a:solidFill>
+                      <a:prstDash val="solid"/>
+                      <a:round/>
+                      <a:headEnd type="none" w="med" len="med"/>
+                      <a:tailEnd type="none" w="med" len="med"/>
+                    </a:lnR>
+                    <a:lnT w="12700" cap="flat" cmpd="sng" algn="ctr">
+                      <a:solidFill>
+                        <a:schemeClr val="tx1"/>
+                      </a:solidFill>
+                      <a:prstDash val="solid"/>
+                      <a:round/>
+                      <a:headEnd type="none" w="med" len="med"/>
+                      <a:tailEnd type="none" w="med" len="med"/>
+                    </a:lnT>
+                    <a:lnB w="12700" cap="flat" cmpd="sng" algn="ctr">
+                      <a:solidFill>
+                        <a:schemeClr val="tx1"/>
+                      </a:solidFill>
+                      <a:prstDash val="solid"/>
+                      <a:round/>
+                      <a:headEnd type="none" w="med" len="med"/>
+                      <a:tailEnd type="none" w="med" len="med"/>
+                    </a:lnB>
+                    <a:solidFill>
+                      <a:schemeClr val="tx2">
+                        <a:lumMod val="40000"/>
+                        <a:lumOff val="60000"/>
+                      </a:schemeClr>
+                    </a:solidFill>
+                  </a:tcPr>
+                </a:tc>
+              </a:tr>
+              <a:tr h="370840">
+                <a:tc>
+                  <a:txBody>
+                    <a:bodyPr/>
+                    <a:lstStyle/>
+                    <a:p>
+                      <a:r>
+                        <a:rPr lang="en-US" b="0" dirty="0" smtClean="0">
+                          <a:solidFill>
+                            <a:schemeClr val="bg1"/>
+                          </a:solidFill>
+                        </a:rPr>
+                        <a:t>RVM </a:t>
+                      </a:r>
+                      <a:r>
+                        <a:rPr lang="en-US" b="0" baseline="0" dirty="0" smtClean="0">
+                          <a:solidFill>
+                            <a:schemeClr val="bg1"/>
+                          </a:solidFill>
+                        </a:rPr>
+                        <a:t>Requirement Wording</a:t>
+                      </a:r>
+                      <a:endParaRPr lang="en-US" b="0" dirty="0">
+                        <a:solidFill>
+                          <a:schemeClr val="bg1"/>
+                        </a:solidFill>
+                      </a:endParaRPr>
+                    </a:p>
+                  </a:txBody>
+                  <a:tcPr anchor="ctr">
+                    <a:lnL w="12700" cap="flat" cmpd="sng" algn="ctr">
+                      <a:solidFill>
+                        <a:schemeClr val="tx1"/>
+                      </a:solidFill>
+                      <a:prstDash val="solid"/>
+                      <a:round/>
+                      <a:headEnd type="none" w="med" len="med"/>
+                      <a:tailEnd type="none" w="med" len="med"/>
+                    </a:lnL>
+                    <a:lnR w="12700" cap="flat" cmpd="sng" algn="ctr">
+                      <a:solidFill>
+                        <a:schemeClr val="tx1"/>
+                      </a:solidFill>
+                      <a:prstDash val="solid"/>
+                      <a:round/>
+                      <a:headEnd type="none" w="med" len="med"/>
+                      <a:tailEnd type="none" w="med" len="med"/>
+                    </a:lnR>
+                    <a:lnT w="12700" cap="flat" cmpd="sng" algn="ctr">
+                      <a:solidFill>
+                        <a:schemeClr val="tx1"/>
+                      </a:solidFill>
+                      <a:prstDash val="solid"/>
+                      <a:round/>
+                      <a:headEnd type="none" w="med" len="med"/>
+                      <a:tailEnd type="none" w="med" len="med"/>
+                    </a:lnT>
+                    <a:lnB w="12700" cap="flat" cmpd="sng" algn="ctr">
+                      <a:solidFill>
+                        <a:schemeClr val="tx1"/>
+                      </a:solidFill>
+                      <a:prstDash val="solid"/>
+                      <a:round/>
+                      <a:headEnd type="none" w="med" len="med"/>
+                      <a:tailEnd type="none" w="med" len="med"/>
+                    </a:lnB>
+                    <a:solidFill>
+                      <a:schemeClr val="tx2">
+                        <a:lumMod val="75000"/>
+                      </a:schemeClr>
+                    </a:solidFill>
+                  </a:tcPr>
+                </a:tc>
+                <a:tc>
+                  <a:txBody>
+                    <a:bodyPr/>
+                    <a:lstStyle/>
+                    <a:p>
+                      <a:r>
+                        <a:rPr lang="en-US" b="1" dirty="0" smtClean="0">
+                          <a:solidFill>
+                            <a:schemeClr val="tx1"/>
+                          </a:solidFill>
+                        </a:rPr>
+                        <a:t>Static Thrust testing will be performed with the flight pressure vessel  prior to </a:t>
+                      </a:r>
+                      <a:r>
+                        <a:rPr lang="en-US" b="1" dirty="0" err="1" smtClean="0">
+                          <a:solidFill>
+                            <a:schemeClr val="tx1"/>
+                          </a:solidFill>
+                        </a:rPr>
+                        <a:t>CubeSat</a:t>
+                      </a:r>
+                      <a:r>
+                        <a:rPr lang="en-US" b="1" dirty="0" smtClean="0">
+                          <a:solidFill>
+                            <a:schemeClr val="tx1"/>
+                          </a:solidFill>
+                        </a:rPr>
+                        <a:t> integration at a pressure no greater than 1x10^-4 </a:t>
+                      </a:r>
+                      <a:r>
+                        <a:rPr lang="en-US" b="1" dirty="0" err="1" smtClean="0">
+                          <a:solidFill>
+                            <a:schemeClr val="tx1"/>
+                          </a:solidFill>
+                        </a:rPr>
+                        <a:t>Torr</a:t>
+                      </a:r>
+                      <a:endParaRPr lang="en-US" b="1" dirty="0">
+                        <a:solidFill>
+                          <a:schemeClr val="tx1"/>
+                        </a:solidFill>
+                      </a:endParaRPr>
+                    </a:p>
+                  </a:txBody>
+                  <a:tcPr>
+                    <a:lnL w="12700" cap="flat" cmpd="sng" algn="ctr">
+                      <a:solidFill>
+                        <a:schemeClr val="tx1"/>
+                      </a:solidFill>
+                      <a:prstDash val="solid"/>
+                      <a:round/>
+                      <a:headEnd type="none" w="med" len="med"/>
+                      <a:tailEnd type="none" w="med" len="med"/>
+                    </a:lnL>
+                    <a:lnR w="12700" cap="flat" cmpd="sng" algn="ctr">
+                      <a:solidFill>
+                        <a:schemeClr val="tx1"/>
+                      </a:solidFill>
+                      <a:prstDash val="solid"/>
+                      <a:round/>
+                      <a:headEnd type="none" w="med" len="med"/>
+                      <a:tailEnd type="none" w="med" len="med"/>
+                    </a:lnR>
+                    <a:lnT w="12700" cap="flat" cmpd="sng" algn="ctr">
+                      <a:solidFill>
+                        <a:schemeClr val="tx1"/>
+                      </a:solidFill>
+                      <a:prstDash val="solid"/>
+                      <a:round/>
+                      <a:headEnd type="none" w="med" len="med"/>
+                      <a:tailEnd type="none" w="med" len="med"/>
+                    </a:lnT>
+                    <a:lnB w="12700" cap="flat" cmpd="sng" algn="ctr">
+                      <a:solidFill>
+                        <a:schemeClr val="tx1"/>
+                      </a:solidFill>
+                      <a:prstDash val="solid"/>
+                      <a:round/>
+                      <a:headEnd type="none" w="med" len="med"/>
+                      <a:tailEnd type="none" w="med" len="med"/>
+                    </a:lnB>
+                    <a:solidFill>
+                      <a:schemeClr val="tx2">
+                        <a:lumMod val="40000"/>
+                        <a:lumOff val="60000"/>
+                      </a:schemeClr>
+                    </a:solidFill>
+                  </a:tcPr>
+                </a:tc>
+              </a:tr>
+              <a:tr h="370840">
+                <a:tc>
+                  <a:txBody>
+                    <a:bodyPr/>
+                    <a:lstStyle/>
+                    <a:p>
+                      <a:r>
+                        <a:rPr lang="en-US" b="0" dirty="0" smtClean="0">
+                          <a:solidFill>
+                            <a:schemeClr val="bg1"/>
+                          </a:solidFill>
+                        </a:rPr>
+                        <a:t>Validation Method</a:t>
+                      </a:r>
+                      <a:endParaRPr lang="en-US" b="0" dirty="0">
+                        <a:solidFill>
+                          <a:schemeClr val="bg1"/>
+                        </a:solidFill>
+                      </a:endParaRPr>
+                    </a:p>
+                  </a:txBody>
+                  <a:tcPr anchor="ctr">
+                    <a:lnL w="12700" cap="flat" cmpd="sng" algn="ctr">
+                      <a:solidFill>
+                        <a:schemeClr val="tx1"/>
+                      </a:solidFill>
+                      <a:prstDash val="solid"/>
+                      <a:round/>
+                      <a:headEnd type="none" w="med" len="med"/>
+                      <a:tailEnd type="none" w="med" len="med"/>
+                    </a:lnL>
+                    <a:lnR w="12700" cap="flat" cmpd="sng" algn="ctr">
+                      <a:solidFill>
+                        <a:schemeClr val="tx1"/>
+                      </a:solidFill>
+                      <a:prstDash val="solid"/>
+                      <a:round/>
+                      <a:headEnd type="none" w="med" len="med"/>
+                      <a:tailEnd type="none" w="med" len="med"/>
+                    </a:lnR>
+                    <a:lnT w="12700" cap="flat" cmpd="sng" algn="ctr">
+                      <a:solidFill>
+                        <a:schemeClr val="tx1"/>
+                      </a:solidFill>
+                      <a:prstDash val="solid"/>
+                      <a:round/>
+                      <a:headEnd type="none" w="med" len="med"/>
+                      <a:tailEnd type="none" w="med" len="med"/>
+                    </a:lnT>
+                    <a:lnB w="12700" cap="flat" cmpd="sng" algn="ctr">
+                      <a:solidFill>
+                        <a:schemeClr val="tx1"/>
+                      </a:solidFill>
+                      <a:prstDash val="solid"/>
+                      <a:round/>
+                      <a:headEnd type="none" w="med" len="med"/>
+                      <a:tailEnd type="none" w="med" len="med"/>
+                    </a:lnB>
+                    <a:solidFill>
+                      <a:schemeClr val="tx2">
+                        <a:lumMod val="75000"/>
+                      </a:schemeClr>
+                    </a:solidFill>
+                  </a:tcPr>
+                </a:tc>
+                <a:tc>
+                  <a:txBody>
+                    <a:bodyPr/>
+                    <a:lstStyle/>
+                    <a:p>
+                      <a:r>
+                        <a:rPr lang="en-US" b="1" i="1" dirty="0" smtClean="0">
+                          <a:solidFill>
+                            <a:schemeClr val="tx1"/>
+                          </a:solidFill>
+                        </a:rPr>
+                        <a:t>Test</a:t>
+                      </a:r>
+                      <a:endParaRPr lang="en-US" b="1" i="1" dirty="0">
+                        <a:solidFill>
+                          <a:schemeClr val="tx1"/>
+                        </a:solidFill>
+                      </a:endParaRPr>
+                    </a:p>
+                  </a:txBody>
+                  <a:tcPr>
+                    <a:lnL w="12700" cap="flat" cmpd="sng" algn="ctr">
+                      <a:solidFill>
+                        <a:schemeClr val="tx1"/>
+                      </a:solidFill>
+                      <a:prstDash val="solid"/>
+                      <a:round/>
+                      <a:headEnd type="none" w="med" len="med"/>
+                      <a:tailEnd type="none" w="med" len="med"/>
+                    </a:lnL>
+                    <a:lnR w="12700" cap="flat" cmpd="sng" algn="ctr">
+                      <a:solidFill>
+                        <a:schemeClr val="tx1"/>
+                      </a:solidFill>
+                      <a:prstDash val="solid"/>
+                      <a:round/>
+                      <a:headEnd type="none" w="med" len="med"/>
+                      <a:tailEnd type="none" w="med" len="med"/>
+                    </a:lnR>
+                    <a:lnT w="12700" cap="flat" cmpd="sng" algn="ctr">
+                      <a:solidFill>
+                        <a:schemeClr val="tx1"/>
+                      </a:solidFill>
+                      <a:prstDash val="solid"/>
+                      <a:round/>
+                      <a:headEnd type="none" w="med" len="med"/>
+                      <a:tailEnd type="none" w="med" len="med"/>
+                    </a:lnT>
+                    <a:lnB w="12700" cap="flat" cmpd="sng" algn="ctr">
+                      <a:solidFill>
+                        <a:schemeClr val="tx1"/>
+                      </a:solidFill>
+                      <a:prstDash val="solid"/>
+                      <a:round/>
+                      <a:headEnd type="none" w="med" len="med"/>
+                      <a:tailEnd type="none" w="med" len="med"/>
+                    </a:lnB>
+                    <a:solidFill>
+                      <a:schemeClr val="tx2">
+                        <a:lumMod val="40000"/>
+                        <a:lumOff val="60000"/>
+                      </a:schemeClr>
+                    </a:solidFill>
+                  </a:tcPr>
+                </a:tc>
+              </a:tr>
+            </a:tbl>
+          </a:graphicData>
+        </a:graphic>
+      </p:graphicFrame>
+      <p:sp>
+        <p:nvSpPr>
+          <p:cNvPr id="5" name="TextBox 4"/>
+          <p:cNvSpPr txBox="1"/>
+          <p:nvPr/>
+        </p:nvSpPr>
+        <p:spPr>
+          <a:xfrm>
+            <a:off x="381000" y="3676471"/>
+            <a:ext cx="8305800" cy="830997"/>
+          </a:xfrm>
+          <a:prstGeom prst="rect">
+            <a:avLst/>
+          </a:prstGeom>
+          <a:noFill/>
+        </p:spPr>
+        <p:txBody>
+          <a:bodyPr wrap="square" rtlCol="0">
+            <a:spAutoFit/>
+          </a:bodyPr>
+          <a:lstStyle/>
+          <a:p>
+            <a:r>
+              <a:rPr lang="en-US" sz="2400" dirty="0" smtClean="0"/>
+              <a:t>The propulsion system must pass the static test fire with no anomalies to meet this requirement.</a:t>
+            </a:r>
+            <a:endParaRPr lang="en-US" sz="2400" b="1" i="1" dirty="0"/>
+          </a:p>
+        </p:txBody>
+      </p:sp>
+    </p:spTree>
+    <p:extLst>
+      <p:ext uri="{BB962C8B-B14F-4D97-AF65-F5344CB8AC3E}">
+        <p14:creationId xmlns:p14="http://schemas.microsoft.com/office/powerpoint/2010/main" val="32129990"/>
+      </p:ext>
+    </p:extLst>
+  </p:cSld>
+  <p:clrMapOvr>
+    <a:masterClrMapping/>
+  </p:clrMapOvr>
+  <p:timing>
+    <p:tnLst>
+      <p:par>
+        <p:cTn id="1" dur="indefinite" restart="never" nodeType="tmRoot"/>
+      </p:par>
+    </p:tnLst>
+  </p:timing>
+</p:sld>
+</file>
+
+<file path=ppt/slides/slide3.xml><?xml version="1.0" encoding="utf-8"?>
+<p:sld xmlns:a="http://schemas.openxmlformats.org/drawingml/2006/main" xmlns:r="http://schemas.openxmlformats.org/officeDocument/2006/relationships" xmlns:p="http://schemas.openxmlformats.org/presentationml/2006/main">
+  <p:cSld>
+    <p:spTree>
+      <p:nvGrpSpPr>
+        <p:cNvPr id="1" name=""/>
+        <p:cNvGrpSpPr/>
+        <p:nvPr/>
+      </p:nvGrpSpPr>
+      <p:grpSpPr>
+        <a:xfrm>
+          <a:off x="0" y="0"/>
+          <a:ext cx="0" cy="0"/>
+          <a:chOff x="0" y="0"/>
+          <a:chExt cx="0" cy="0"/>
+        </a:xfrm>
+      </p:grpSpPr>
+      <p:sp>
+        <p:nvSpPr>
+          <p:cNvPr id="2" name="Title 1"/>
+          <p:cNvSpPr>
+            <a:spLocks noGrp="1"/>
+          </p:cNvSpPr>
+          <p:nvPr>
+            <p:ph type="title"/>
+          </p:nvPr>
+        </p:nvSpPr>
+        <p:spPr/>
+        <p:txBody>
+          <a:bodyPr>
+            <a:normAutofit/>
+          </a:bodyPr>
+          <a:lstStyle/>
+          <a:p>
+            <a:r>
+              <a:rPr lang="en-US" i="1" dirty="0" smtClean="0"/>
+              <a:t>RCL.PL.PRP3</a:t>
+            </a:r>
+            <a:endParaRPr lang="en-US" i="1" dirty="0"/>
+          </a:p>
+        </p:txBody>
+      </p:sp>
+      <p:graphicFrame>
+        <p:nvGraphicFramePr>
+          <p:cNvPr id="4" name="Content Placeholder 3"/>
+          <p:cNvGraphicFramePr>
+            <a:graphicFrameLocks noGrp="1"/>
+          </p:cNvGraphicFramePr>
+          <p:nvPr>
+            <p:ph idx="1"/>
+            <p:extLst>
+              <p:ext uri="{D42A27DB-BD31-4B8C-83A1-F6EECF244321}">
+                <p14:modId xmlns:p14="http://schemas.microsoft.com/office/powerpoint/2010/main" val="3032906774"/>
+              </p:ext>
+            </p:extLst>
+          </p:nvPr>
+        </p:nvGraphicFramePr>
+        <p:xfrm>
+          <a:off x="457200" y="1371600"/>
+          <a:ext cx="8229600" cy="1656080"/>
+        </p:xfrm>
+        <a:graphic>
+          <a:graphicData uri="http://schemas.openxmlformats.org/drawingml/2006/table">
+            <a:tbl>
+              <a:tblPr firstRow="1" bandRow="1">
+                <a:tableStyleId>{5C22544A-7EE6-4342-B048-85BDC9FD1C3A}</a:tableStyleId>
+              </a:tblPr>
+              <a:tblGrid>
+                <a:gridCol w="3200400"/>
+                <a:gridCol w="5029200"/>
+              </a:tblGrid>
+              <a:tr h="370840">
+                <a:tc>
+                  <a:txBody>
+                    <a:bodyPr/>
+                    <a:lstStyle/>
+                    <a:p>
+                      <a:r>
+                        <a:rPr lang="en-US" b="0" dirty="0" smtClean="0">
+                          <a:solidFill>
+                            <a:schemeClr val="bg1"/>
+                          </a:solidFill>
+                        </a:rPr>
+                        <a:t> RVM Requirement Number</a:t>
+                      </a:r>
+                      <a:endParaRPr lang="en-US" b="0" dirty="0">
+                        <a:solidFill>
+                          <a:schemeClr val="bg1"/>
+                        </a:solidFill>
+                      </a:endParaRPr>
+                    </a:p>
+                  </a:txBody>
+                  <a:tcPr anchor="ctr">
+                    <a:lnL w="12700" cap="flat" cmpd="sng" algn="ctr">
+                      <a:solidFill>
+                        <a:schemeClr val="tx1"/>
+                      </a:solidFill>
+                      <a:prstDash val="solid"/>
+                      <a:round/>
+                      <a:headEnd type="none" w="med" len="med"/>
+                      <a:tailEnd type="none" w="med" len="med"/>
+                    </a:lnL>
+                    <a:lnR w="12700" cap="flat" cmpd="sng" algn="ctr">
+                      <a:solidFill>
+                        <a:schemeClr val="tx1"/>
+                      </a:solidFill>
+                      <a:prstDash val="solid"/>
+                      <a:round/>
+                      <a:headEnd type="none" w="med" len="med"/>
+                      <a:tailEnd type="none" w="med" len="med"/>
+                    </a:lnR>
+                    <a:lnT w="12700" cap="flat" cmpd="sng" algn="ctr">
+                      <a:solidFill>
+                        <a:schemeClr val="tx1"/>
+                      </a:solidFill>
+                      <a:prstDash val="solid"/>
+                      <a:round/>
+                      <a:headEnd type="none" w="med" len="med"/>
+                      <a:tailEnd type="none" w="med" len="med"/>
+                    </a:lnT>
+                    <a:lnB w="12700" cap="flat" cmpd="sng" algn="ctr">
+                      <a:solidFill>
+                        <a:schemeClr val="tx1"/>
+                      </a:solidFill>
+                      <a:prstDash val="solid"/>
+                      <a:round/>
+                      <a:headEnd type="none" w="med" len="med"/>
+                      <a:tailEnd type="none" w="med" len="med"/>
+                    </a:lnB>
+                    <a:solidFill>
+                      <a:schemeClr val="tx2">
+                        <a:lumMod val="75000"/>
+                      </a:schemeClr>
+                    </a:solidFill>
+                  </a:tcPr>
+                </a:tc>
+                <a:tc>
+                  <a:txBody>
+                    <a:bodyPr/>
+                    <a:lstStyle/>
+                    <a:p>
+                      <a:r>
+                        <a:rPr lang="en-US" b="1" dirty="0" smtClean="0">
+                          <a:solidFill>
+                            <a:schemeClr val="tx1"/>
+                          </a:solidFill>
+                        </a:rPr>
+                        <a:t>3</a:t>
+                      </a:r>
+                      <a:endParaRPr lang="en-US" b="1" dirty="0">
+                        <a:solidFill>
+                          <a:schemeClr val="tx1"/>
+                        </a:solidFill>
+                      </a:endParaRPr>
+                    </a:p>
+                  </a:txBody>
+                  <a:tcPr>
+                    <a:lnL w="12700" cap="flat" cmpd="sng" algn="ctr">
+                      <a:solidFill>
+                        <a:schemeClr val="tx1"/>
+                      </a:solidFill>
+                      <a:prstDash val="solid"/>
+                      <a:round/>
+                      <a:headEnd type="none" w="med" len="med"/>
+                      <a:tailEnd type="none" w="med" len="med"/>
+                    </a:lnL>
+                    <a:lnR w="12700" cap="flat" cmpd="sng" algn="ctr">
+                      <a:solidFill>
+                        <a:schemeClr val="tx1"/>
+                      </a:solidFill>
+                      <a:prstDash val="solid"/>
+                      <a:round/>
+                      <a:headEnd type="none" w="med" len="med"/>
+                      <a:tailEnd type="none" w="med" len="med"/>
+                    </a:lnR>
+                    <a:lnT w="12700" cap="flat" cmpd="sng" algn="ctr">
+                      <a:solidFill>
+                        <a:schemeClr val="tx1"/>
+                      </a:solidFill>
+                      <a:prstDash val="solid"/>
+                      <a:round/>
+                      <a:headEnd type="none" w="med" len="med"/>
+                      <a:tailEnd type="none" w="med" len="med"/>
+                    </a:lnT>
+                    <a:lnB w="12700" cap="flat" cmpd="sng" algn="ctr">
+                      <a:solidFill>
+                        <a:schemeClr val="tx1"/>
+                      </a:solidFill>
+                      <a:prstDash val="solid"/>
+                      <a:round/>
+                      <a:headEnd type="none" w="med" len="med"/>
+                      <a:tailEnd type="none" w="med" len="med"/>
+                    </a:lnB>
+                    <a:solidFill>
+                      <a:schemeClr val="tx2">
+                        <a:lumMod val="40000"/>
+                        <a:lumOff val="60000"/>
+                      </a:schemeClr>
+                    </a:solidFill>
+                  </a:tcPr>
+                </a:tc>
+              </a:tr>
+              <a:tr h="370840">
+                <a:tc>
+                  <a:txBody>
+                    <a:bodyPr/>
+                    <a:lstStyle/>
+                    <a:p>
+                      <a:r>
+                        <a:rPr lang="en-US" b="0" dirty="0" smtClean="0">
+                          <a:solidFill>
+                            <a:schemeClr val="bg1"/>
+                          </a:solidFill>
+                        </a:rPr>
+                        <a:t>RVM </a:t>
+                      </a:r>
+                      <a:r>
+                        <a:rPr lang="en-US" b="0" baseline="0" dirty="0" smtClean="0">
+                          <a:solidFill>
+                            <a:schemeClr val="bg1"/>
+                          </a:solidFill>
+                        </a:rPr>
+                        <a:t>Requirement Wording</a:t>
+                      </a:r>
+                      <a:endParaRPr lang="en-US" b="0" dirty="0">
+                        <a:solidFill>
+                          <a:schemeClr val="bg1"/>
+                        </a:solidFill>
+                      </a:endParaRPr>
+                    </a:p>
+                  </a:txBody>
+                  <a:tcPr anchor="ctr">
+                    <a:lnL w="12700" cap="flat" cmpd="sng" algn="ctr">
+                      <a:solidFill>
+                        <a:schemeClr val="tx1"/>
+                      </a:solidFill>
+                      <a:prstDash val="solid"/>
+                      <a:round/>
+                      <a:headEnd type="none" w="med" len="med"/>
+                      <a:tailEnd type="none" w="med" len="med"/>
+                    </a:lnL>
+                    <a:lnR w="12700" cap="flat" cmpd="sng" algn="ctr">
+                      <a:solidFill>
+                        <a:schemeClr val="tx1"/>
+                      </a:solidFill>
+                      <a:prstDash val="solid"/>
+                      <a:round/>
+                      <a:headEnd type="none" w="med" len="med"/>
+                      <a:tailEnd type="none" w="med" len="med"/>
+                    </a:lnR>
+                    <a:lnT w="12700" cap="flat" cmpd="sng" algn="ctr">
+                      <a:solidFill>
+                        <a:schemeClr val="tx1"/>
+                      </a:solidFill>
+                      <a:prstDash val="solid"/>
+                      <a:round/>
+                      <a:headEnd type="none" w="med" len="med"/>
+                      <a:tailEnd type="none" w="med" len="med"/>
+                    </a:lnT>
+                    <a:lnB w="12700" cap="flat" cmpd="sng" algn="ctr">
+                      <a:solidFill>
+                        <a:schemeClr val="tx1"/>
+                      </a:solidFill>
+                      <a:prstDash val="solid"/>
+                      <a:round/>
+                      <a:headEnd type="none" w="med" len="med"/>
+                      <a:tailEnd type="none" w="med" len="med"/>
+                    </a:lnB>
+                    <a:solidFill>
+                      <a:schemeClr val="tx2">
+                        <a:lumMod val="75000"/>
+                      </a:schemeClr>
+                    </a:solidFill>
+                  </a:tcPr>
+                </a:tc>
+                <a:tc>
+                  <a:txBody>
+                    <a:bodyPr/>
+                    <a:lstStyle/>
+                    <a:p>
+                      <a:r>
+                        <a:rPr lang="en-US" b="1" dirty="0" smtClean="0">
+                          <a:solidFill>
+                            <a:schemeClr val="tx1"/>
+                          </a:solidFill>
+                        </a:rPr>
+                        <a:t>The pressure vessel must pass thermal cycle testing between temperatures of -30 ⁰C and 70 ⁰C for a total of two cycles or 10 hours</a:t>
+                      </a:r>
+                      <a:endParaRPr lang="en-US" b="1" dirty="0">
+                        <a:solidFill>
+                          <a:schemeClr val="tx1"/>
+                        </a:solidFill>
+                      </a:endParaRPr>
+                    </a:p>
+                  </a:txBody>
+                  <a:tcPr>
+                    <a:lnL w="12700" cap="flat" cmpd="sng" algn="ctr">
+                      <a:solidFill>
+                        <a:schemeClr val="tx1"/>
+                      </a:solidFill>
+                      <a:prstDash val="solid"/>
+                      <a:round/>
+                      <a:headEnd type="none" w="med" len="med"/>
+                      <a:tailEnd type="none" w="med" len="med"/>
+                    </a:lnL>
+                    <a:lnR w="12700" cap="flat" cmpd="sng" algn="ctr">
+                      <a:solidFill>
+                        <a:schemeClr val="tx1"/>
+                      </a:solidFill>
+                      <a:prstDash val="solid"/>
+                      <a:round/>
+                      <a:headEnd type="none" w="med" len="med"/>
+                      <a:tailEnd type="none" w="med" len="med"/>
+                    </a:lnR>
+                    <a:lnT w="12700" cap="flat" cmpd="sng" algn="ctr">
+                      <a:solidFill>
+                        <a:schemeClr val="tx1"/>
+                      </a:solidFill>
+                      <a:prstDash val="solid"/>
+                      <a:round/>
+                      <a:headEnd type="none" w="med" len="med"/>
+                      <a:tailEnd type="none" w="med" len="med"/>
+                    </a:lnT>
+                    <a:lnB w="12700" cap="flat" cmpd="sng" algn="ctr">
+                      <a:solidFill>
+                        <a:schemeClr val="tx1"/>
+                      </a:solidFill>
+                      <a:prstDash val="solid"/>
+                      <a:round/>
+                      <a:headEnd type="none" w="med" len="med"/>
+                      <a:tailEnd type="none" w="med" len="med"/>
+                    </a:lnB>
+                    <a:solidFill>
+                      <a:schemeClr val="tx2">
+                        <a:lumMod val="40000"/>
+                        <a:lumOff val="60000"/>
+                      </a:schemeClr>
+                    </a:solidFill>
+                  </a:tcPr>
+                </a:tc>
+              </a:tr>
+              <a:tr h="370840">
+                <a:tc>
+                  <a:txBody>
+                    <a:bodyPr/>
+                    <a:lstStyle/>
+                    <a:p>
+                      <a:r>
+                        <a:rPr lang="en-US" b="0" dirty="0" smtClean="0">
+                          <a:solidFill>
+                            <a:schemeClr val="bg1"/>
+                          </a:solidFill>
+                        </a:rPr>
+                        <a:t>Validation Method</a:t>
+                      </a:r>
+                      <a:endParaRPr lang="en-US" b="0" dirty="0">
+                        <a:solidFill>
+                          <a:schemeClr val="bg1"/>
+                        </a:solidFill>
+                      </a:endParaRPr>
+                    </a:p>
+                  </a:txBody>
+                  <a:tcPr anchor="ctr">
+                    <a:lnL w="12700" cap="flat" cmpd="sng" algn="ctr">
+                      <a:solidFill>
+                        <a:schemeClr val="tx1"/>
+                      </a:solidFill>
+                      <a:prstDash val="solid"/>
+                      <a:round/>
+                      <a:headEnd type="none" w="med" len="med"/>
+                      <a:tailEnd type="none" w="med" len="med"/>
+                    </a:lnL>
+                    <a:lnR w="12700" cap="flat" cmpd="sng" algn="ctr">
+                      <a:solidFill>
+                        <a:schemeClr val="tx1"/>
+                      </a:solidFill>
+                      <a:prstDash val="solid"/>
+                      <a:round/>
+                      <a:headEnd type="none" w="med" len="med"/>
+                      <a:tailEnd type="none" w="med" len="med"/>
+                    </a:lnR>
+                    <a:lnT w="12700" cap="flat" cmpd="sng" algn="ctr">
+                      <a:solidFill>
+                        <a:schemeClr val="tx1"/>
+                      </a:solidFill>
+                      <a:prstDash val="solid"/>
+                      <a:round/>
+                      <a:headEnd type="none" w="med" len="med"/>
+                      <a:tailEnd type="none" w="med" len="med"/>
+                    </a:lnT>
+                    <a:lnB w="12700" cap="flat" cmpd="sng" algn="ctr">
+                      <a:solidFill>
+                        <a:schemeClr val="tx1"/>
+                      </a:solidFill>
+                      <a:prstDash val="solid"/>
+                      <a:round/>
+                      <a:headEnd type="none" w="med" len="med"/>
+                      <a:tailEnd type="none" w="med" len="med"/>
+                    </a:lnB>
+                    <a:solidFill>
+                      <a:schemeClr val="tx2">
+                        <a:lumMod val="75000"/>
+                      </a:schemeClr>
+                    </a:solidFill>
+                  </a:tcPr>
+                </a:tc>
+                <a:tc>
+                  <a:txBody>
+                    <a:bodyPr/>
+                    <a:lstStyle/>
+                    <a:p>
+                      <a:r>
+                        <a:rPr lang="en-US" b="1" i="1" dirty="0" smtClean="0">
+                          <a:solidFill>
+                            <a:schemeClr val="tx1"/>
+                          </a:solidFill>
+                        </a:rPr>
+                        <a:t>Test</a:t>
+                      </a:r>
+                      <a:endParaRPr lang="en-US" b="1" i="1" dirty="0">
+                        <a:solidFill>
+                          <a:schemeClr val="tx1"/>
+                        </a:solidFill>
+                      </a:endParaRPr>
+                    </a:p>
+                  </a:txBody>
+                  <a:tcPr>
+                    <a:lnL w="12700" cap="flat" cmpd="sng" algn="ctr">
+                      <a:solidFill>
+                        <a:schemeClr val="tx1"/>
+                      </a:solidFill>
+                      <a:prstDash val="solid"/>
+                      <a:round/>
+                      <a:headEnd type="none" w="med" len="med"/>
+                      <a:tailEnd type="none" w="med" len="med"/>
+                    </a:lnL>
+                    <a:lnR w="12700" cap="flat" cmpd="sng" algn="ctr">
+                      <a:solidFill>
+                        <a:schemeClr val="tx1"/>
+                      </a:solidFill>
+                      <a:prstDash val="solid"/>
+                      <a:round/>
+                      <a:headEnd type="none" w="med" len="med"/>
+                      <a:tailEnd type="none" w="med" len="med"/>
+                    </a:lnR>
+                    <a:lnT w="12700" cap="flat" cmpd="sng" algn="ctr">
+                      <a:solidFill>
+                        <a:schemeClr val="tx1"/>
+                      </a:solidFill>
+                      <a:prstDash val="solid"/>
+                      <a:round/>
+                      <a:headEnd type="none" w="med" len="med"/>
+                      <a:tailEnd type="none" w="med" len="med"/>
+                    </a:lnT>
+                    <a:lnB w="12700" cap="flat" cmpd="sng" algn="ctr">
+                      <a:solidFill>
+                        <a:schemeClr val="tx1"/>
+                      </a:solidFill>
+                      <a:prstDash val="solid"/>
+                      <a:round/>
+                      <a:headEnd type="none" w="med" len="med"/>
+                      <a:tailEnd type="none" w="med" len="med"/>
+                    </a:lnB>
+                    <a:solidFill>
+                      <a:schemeClr val="tx2">
+                        <a:lumMod val="40000"/>
+                        <a:lumOff val="60000"/>
+                      </a:schemeClr>
+                    </a:solidFill>
+                  </a:tcPr>
+                </a:tc>
+              </a:tr>
+            </a:tbl>
+          </a:graphicData>
+        </a:graphic>
+      </p:graphicFrame>
+      <p:sp>
+        <p:nvSpPr>
+          <p:cNvPr id="5" name="TextBox 4"/>
+          <p:cNvSpPr txBox="1"/>
+          <p:nvPr/>
+        </p:nvSpPr>
+        <p:spPr>
+          <a:xfrm>
+            <a:off x="381000" y="3676471"/>
+            <a:ext cx="8305800" cy="1200329"/>
+          </a:xfrm>
+          <a:prstGeom prst="rect">
+            <a:avLst/>
+          </a:prstGeom>
+          <a:noFill/>
+        </p:spPr>
+        <p:txBody>
+          <a:bodyPr wrap="square" rtlCol="0">
+            <a:spAutoFit/>
+          </a:bodyPr>
+          <a:lstStyle/>
+          <a:p>
+            <a:r>
+              <a:rPr lang="en-US" sz="2400" dirty="0"/>
+              <a:t>T</a:t>
+            </a:r>
+            <a:r>
+              <a:rPr lang="en-US" sz="2400" dirty="0" smtClean="0"/>
+              <a:t>he </a:t>
+            </a:r>
+            <a:r>
+              <a:rPr lang="en-US" sz="2400" dirty="0"/>
+              <a:t>propulsion system shall perform static thrusts before the thermal cycle, </a:t>
+            </a:r>
+            <a:r>
+              <a:rPr lang="en-US" sz="2400" dirty="0" smtClean="0"/>
+              <a:t>during the cycle </a:t>
+            </a:r>
+            <a:r>
+              <a:rPr lang="en-US" sz="2400" dirty="0"/>
+              <a:t>at various </a:t>
+            </a:r>
+            <a:r>
+              <a:rPr lang="en-US" sz="2400" dirty="0" smtClean="0"/>
+              <a:t>points, and finally</a:t>
+            </a:r>
+            <a:r>
+              <a:rPr lang="en-US" sz="2400" dirty="0"/>
+              <a:t>, </a:t>
+            </a:r>
+            <a:r>
+              <a:rPr lang="en-US" sz="2400" dirty="0" smtClean="0"/>
+              <a:t>after </a:t>
+            </a:r>
+            <a:r>
+              <a:rPr lang="en-US" sz="2400" dirty="0"/>
+              <a:t>the thermal </a:t>
+            </a:r>
+            <a:r>
+              <a:rPr lang="en-US" sz="2400" dirty="0" smtClean="0"/>
+              <a:t>cycle.</a:t>
+            </a:r>
+            <a:endParaRPr lang="en-US" sz="2400" dirty="0"/>
+          </a:p>
+        </p:txBody>
+      </p:sp>
+      <p:pic>
+        <p:nvPicPr>
+          <p:cNvPr id="6" name="Picture 5"/>
+          <p:cNvPicPr/>
+          <p:nvPr/>
+        </p:nvPicPr>
+        <p:blipFill>
+          <a:blip r:embed="rId2" cstate="print">
+            <a:extLst>
+              <a:ext uri="{28A0092B-C50C-407E-A947-70E740481C1C}">
+                <a14:useLocalDpi xmlns:a14="http://schemas.microsoft.com/office/drawing/2010/main" val="0"/>
+              </a:ext>
+            </a:extLst>
+          </a:blip>
+          <a:srcRect/>
+          <a:stretch>
+            <a:fillRect/>
+          </a:stretch>
+        </p:blipFill>
+        <p:spPr bwMode="auto">
+          <a:xfrm>
+            <a:off x="5566299" y="4876800"/>
+            <a:ext cx="2356485" cy="1782932"/>
+          </a:xfrm>
+          <a:prstGeom prst="rect">
+            <a:avLst/>
+          </a:prstGeom>
+          <a:noFill/>
+          <a:ln>
+            <a:solidFill>
+              <a:schemeClr val="tx1"/>
+            </a:solidFill>
+          </a:ln>
+        </p:spPr>
+      </p:pic>
+    </p:spTree>
+    <p:extLst>
+      <p:ext uri="{BB962C8B-B14F-4D97-AF65-F5344CB8AC3E}">
+        <p14:creationId xmlns:p14="http://schemas.microsoft.com/office/powerpoint/2010/main" val="3710903375"/>
+      </p:ext>
+    </p:extLst>
+  </p:cSld>
+  <p:clrMapOvr>
+    <a:masterClrMapping/>
+  </p:clrMapOvr>
+  <p:timing>
+    <p:tnLst>
+      <p:par>
+        <p:cTn id="1" dur="indefinite" restart="never" nodeType="tmRoot"/>
+      </p:par>
+    </p:tnLst>
+  </p:timing>
+</p:sld>
+</file>
+
+<file path=ppt/slides/slide4.xml><?xml version="1.0" encoding="utf-8"?>
+<p:sld xmlns:a="http://schemas.openxmlformats.org/drawingml/2006/main" xmlns:r="http://schemas.openxmlformats.org/officeDocument/2006/relationships" xmlns:p="http://schemas.openxmlformats.org/presentationml/2006/main">
+  <p:cSld>
+    <p:spTree>
+      <p:nvGrpSpPr>
+        <p:cNvPr id="1" name=""/>
+        <p:cNvGrpSpPr/>
+        <p:nvPr/>
+      </p:nvGrpSpPr>
+      <p:grpSpPr>
+        <a:xfrm>
+          <a:off x="0" y="0"/>
+          <a:ext cx="0" cy="0"/>
+          <a:chOff x="0" y="0"/>
+          <a:chExt cx="0" cy="0"/>
+        </a:xfrm>
+      </p:grpSpPr>
+      <p:sp>
+        <p:nvSpPr>
+          <p:cNvPr id="2" name="Title 1"/>
+          <p:cNvSpPr>
+            <a:spLocks noGrp="1"/>
+          </p:cNvSpPr>
+          <p:nvPr>
+            <p:ph type="title"/>
+          </p:nvPr>
+        </p:nvSpPr>
+        <p:spPr/>
+        <p:txBody>
+          <a:bodyPr>
+            <a:normAutofit/>
+          </a:bodyPr>
+          <a:lstStyle/>
+          <a:p>
+            <a:r>
+              <a:rPr lang="en-US" i="1" dirty="0" smtClean="0"/>
+              <a:t>RCL.PL.TST1</a:t>
+            </a:r>
+            <a:endParaRPr lang="en-US" i="1" dirty="0"/>
+          </a:p>
+        </p:txBody>
+      </p:sp>
+      <p:graphicFrame>
+        <p:nvGraphicFramePr>
+          <p:cNvPr id="4" name="Content Placeholder 3"/>
+          <p:cNvGraphicFramePr>
+            <a:graphicFrameLocks noGrp="1"/>
+          </p:cNvGraphicFramePr>
+          <p:nvPr>
+            <p:ph idx="1"/>
+            <p:extLst>
+              <p:ext uri="{D42A27DB-BD31-4B8C-83A1-F6EECF244321}">
+                <p14:modId xmlns:p14="http://schemas.microsoft.com/office/powerpoint/2010/main" val="3263583363"/>
+              </p:ext>
+            </p:extLst>
+          </p:nvPr>
+        </p:nvGraphicFramePr>
+        <p:xfrm>
+          <a:off x="457200" y="1371600"/>
+          <a:ext cx="8229600" cy="1381760"/>
+        </p:xfrm>
+        <a:graphic>
+          <a:graphicData uri="http://schemas.openxmlformats.org/drawingml/2006/table">
+            <a:tbl>
+              <a:tblPr firstRow="1" bandRow="1">
+                <a:tableStyleId>{5C22544A-7EE6-4342-B048-85BDC9FD1C3A}</a:tableStyleId>
+              </a:tblPr>
+              <a:tblGrid>
+                <a:gridCol w="3200400"/>
+                <a:gridCol w="5029200"/>
+              </a:tblGrid>
+              <a:tr h="370840">
+                <a:tc>
+                  <a:txBody>
+                    <a:bodyPr/>
+                    <a:lstStyle/>
+                    <a:p>
+                      <a:r>
+                        <a:rPr lang="en-US" b="0" dirty="0" smtClean="0">
+                          <a:solidFill>
+                            <a:schemeClr val="bg1"/>
+                          </a:solidFill>
+                        </a:rPr>
+                        <a:t> RVM Requirement Number</a:t>
+                      </a:r>
+                      <a:endParaRPr lang="en-US" b="0" dirty="0">
+                        <a:solidFill>
+                          <a:schemeClr val="bg1"/>
+                        </a:solidFill>
+                      </a:endParaRPr>
+                    </a:p>
+                  </a:txBody>
+                  <a:tcPr anchor="ctr">
+                    <a:lnL w="12700" cap="flat" cmpd="sng" algn="ctr">
+                      <a:solidFill>
+                        <a:schemeClr val="tx1"/>
+                      </a:solidFill>
+                      <a:prstDash val="solid"/>
+                      <a:round/>
+                      <a:headEnd type="none" w="med" len="med"/>
+                      <a:tailEnd type="none" w="med" len="med"/>
+                    </a:lnL>
+                    <a:lnR w="12700" cap="flat" cmpd="sng" algn="ctr">
+                      <a:solidFill>
+                        <a:schemeClr val="tx1"/>
+                      </a:solidFill>
+                      <a:prstDash val="solid"/>
+                      <a:round/>
+                      <a:headEnd type="none" w="med" len="med"/>
+                      <a:tailEnd type="none" w="med" len="med"/>
+                    </a:lnR>
+                    <a:lnT w="12700" cap="flat" cmpd="sng" algn="ctr">
+                      <a:solidFill>
+                        <a:schemeClr val="tx1"/>
+                      </a:solidFill>
+                      <a:prstDash val="solid"/>
+                      <a:round/>
+                      <a:headEnd type="none" w="med" len="med"/>
+                      <a:tailEnd type="none" w="med" len="med"/>
+                    </a:lnT>
+                    <a:lnB w="12700" cap="flat" cmpd="sng" algn="ctr">
+                      <a:solidFill>
+                        <a:schemeClr val="tx1"/>
+                      </a:solidFill>
+                      <a:prstDash val="solid"/>
+                      <a:round/>
+                      <a:headEnd type="none" w="med" len="med"/>
+                      <a:tailEnd type="none" w="med" len="med"/>
+                    </a:lnB>
+                    <a:solidFill>
+                      <a:schemeClr val="tx2">
+                        <a:lumMod val="75000"/>
+                      </a:schemeClr>
+                    </a:solidFill>
+                  </a:tcPr>
+                </a:tc>
+                <a:tc>
+                  <a:txBody>
+                    <a:bodyPr/>
+                    <a:lstStyle/>
+                    <a:p>
+                      <a:r>
+                        <a:rPr lang="en-US" b="1" dirty="0" smtClean="0">
+                          <a:solidFill>
+                            <a:schemeClr val="tx1"/>
+                          </a:solidFill>
+                        </a:rPr>
+                        <a:t>1</a:t>
+                      </a:r>
+                      <a:endParaRPr lang="en-US" b="1" dirty="0">
+                        <a:solidFill>
+                          <a:schemeClr val="tx1"/>
+                        </a:solidFill>
+                      </a:endParaRPr>
+                    </a:p>
+                  </a:txBody>
+                  <a:tcPr>
+                    <a:lnL w="12700" cap="flat" cmpd="sng" algn="ctr">
+                      <a:solidFill>
+                        <a:schemeClr val="tx1"/>
+                      </a:solidFill>
+                      <a:prstDash val="solid"/>
+                      <a:round/>
+                      <a:headEnd type="none" w="med" len="med"/>
+                      <a:tailEnd type="none" w="med" len="med"/>
+                    </a:lnL>
+                    <a:lnR w="12700" cap="flat" cmpd="sng" algn="ctr">
+                      <a:solidFill>
+                        <a:schemeClr val="tx1"/>
+                      </a:solidFill>
+                      <a:prstDash val="solid"/>
+                      <a:round/>
+                      <a:headEnd type="none" w="med" len="med"/>
+                      <a:tailEnd type="none" w="med" len="med"/>
+                    </a:lnR>
+                    <a:lnT w="12700" cap="flat" cmpd="sng" algn="ctr">
+                      <a:solidFill>
+                        <a:schemeClr val="tx1"/>
+                      </a:solidFill>
+                      <a:prstDash val="solid"/>
+                      <a:round/>
+                      <a:headEnd type="none" w="med" len="med"/>
+                      <a:tailEnd type="none" w="med" len="med"/>
+                    </a:lnT>
+                    <a:lnB w="12700" cap="flat" cmpd="sng" algn="ctr">
+                      <a:solidFill>
+                        <a:schemeClr val="tx1"/>
+                      </a:solidFill>
+                      <a:prstDash val="solid"/>
+                      <a:round/>
+                      <a:headEnd type="none" w="med" len="med"/>
+                      <a:tailEnd type="none" w="med" len="med"/>
+                    </a:lnB>
+                    <a:solidFill>
+                      <a:schemeClr val="tx2">
+                        <a:lumMod val="40000"/>
+                        <a:lumOff val="60000"/>
+                      </a:schemeClr>
+                    </a:solidFill>
+                  </a:tcPr>
+                </a:tc>
+              </a:tr>
+              <a:tr h="370840">
+                <a:tc>
+                  <a:txBody>
+                    <a:bodyPr/>
+                    <a:lstStyle/>
+                    <a:p>
+                      <a:r>
+                        <a:rPr lang="en-US" b="0" dirty="0" smtClean="0">
+                          <a:solidFill>
+                            <a:schemeClr val="bg1"/>
+                          </a:solidFill>
+                        </a:rPr>
+                        <a:t>RVM </a:t>
+                      </a:r>
+                      <a:r>
+                        <a:rPr lang="en-US" b="0" baseline="0" dirty="0" smtClean="0">
+                          <a:solidFill>
+                            <a:schemeClr val="bg1"/>
+                          </a:solidFill>
+                        </a:rPr>
+                        <a:t>Requirement Wording</a:t>
+                      </a:r>
+                      <a:endParaRPr lang="en-US" b="0" dirty="0">
+                        <a:solidFill>
+                          <a:schemeClr val="bg1"/>
+                        </a:solidFill>
+                      </a:endParaRPr>
+                    </a:p>
+                  </a:txBody>
+                  <a:tcPr anchor="ctr">
+                    <a:lnL w="12700" cap="flat" cmpd="sng" algn="ctr">
+                      <a:solidFill>
+                        <a:schemeClr val="tx1"/>
+                      </a:solidFill>
+                      <a:prstDash val="solid"/>
+                      <a:round/>
+                      <a:headEnd type="none" w="med" len="med"/>
+                      <a:tailEnd type="none" w="med" len="med"/>
+                    </a:lnL>
+                    <a:lnR w="12700" cap="flat" cmpd="sng" algn="ctr">
+                      <a:solidFill>
+                        <a:schemeClr val="tx1"/>
+                      </a:solidFill>
+                      <a:prstDash val="solid"/>
+                      <a:round/>
+                      <a:headEnd type="none" w="med" len="med"/>
+                      <a:tailEnd type="none" w="med" len="med"/>
+                    </a:lnR>
+                    <a:lnT w="12700" cap="flat" cmpd="sng" algn="ctr">
+                      <a:solidFill>
+                        <a:schemeClr val="tx1"/>
+                      </a:solidFill>
+                      <a:prstDash val="solid"/>
+                      <a:round/>
+                      <a:headEnd type="none" w="med" len="med"/>
+                      <a:tailEnd type="none" w="med" len="med"/>
+                    </a:lnT>
+                    <a:lnB w="12700" cap="flat" cmpd="sng" algn="ctr">
+                      <a:solidFill>
+                        <a:schemeClr val="tx1"/>
+                      </a:solidFill>
+                      <a:prstDash val="solid"/>
+                      <a:round/>
+                      <a:headEnd type="none" w="med" len="med"/>
+                      <a:tailEnd type="none" w="med" len="med"/>
+                    </a:lnB>
+                    <a:solidFill>
+                      <a:schemeClr val="tx2">
+                        <a:lumMod val="75000"/>
+                      </a:schemeClr>
+                    </a:solidFill>
+                  </a:tcPr>
+                </a:tc>
+                <a:tc>
+                  <a:txBody>
+                    <a:bodyPr/>
+                    <a:lstStyle/>
+                    <a:p>
+                      <a:r>
+                        <a:rPr lang="en-US" b="1" dirty="0" err="1" smtClean="0">
+                          <a:solidFill>
+                            <a:schemeClr val="tx1"/>
+                          </a:solidFill>
+                        </a:rPr>
+                        <a:t>CubeSat</a:t>
+                      </a:r>
+                      <a:r>
+                        <a:rPr lang="en-US" b="1" dirty="0" smtClean="0">
+                          <a:solidFill>
+                            <a:schemeClr val="tx1"/>
+                          </a:solidFill>
+                        </a:rPr>
+                        <a:t> must survive Random Vibration Testing relative to the NASA GEVS Qualification Profile</a:t>
+                      </a:r>
+                      <a:endParaRPr lang="en-US" b="1" dirty="0">
+                        <a:solidFill>
+                          <a:schemeClr val="tx1"/>
+                        </a:solidFill>
+                      </a:endParaRPr>
+                    </a:p>
+                  </a:txBody>
+                  <a:tcPr>
+                    <a:lnL w="12700" cap="flat" cmpd="sng" algn="ctr">
+                      <a:solidFill>
+                        <a:schemeClr val="tx1"/>
+                      </a:solidFill>
+                      <a:prstDash val="solid"/>
+                      <a:round/>
+                      <a:headEnd type="none" w="med" len="med"/>
+                      <a:tailEnd type="none" w="med" len="med"/>
+                    </a:lnL>
+                    <a:lnR w="12700" cap="flat" cmpd="sng" algn="ctr">
+                      <a:solidFill>
+                        <a:schemeClr val="tx1"/>
+                      </a:solidFill>
+                      <a:prstDash val="solid"/>
+                      <a:round/>
+                      <a:headEnd type="none" w="med" len="med"/>
+                      <a:tailEnd type="none" w="med" len="med"/>
+                    </a:lnR>
+                    <a:lnT w="12700" cap="flat" cmpd="sng" algn="ctr">
+                      <a:solidFill>
+                        <a:schemeClr val="tx1"/>
+                      </a:solidFill>
+                      <a:prstDash val="solid"/>
+                      <a:round/>
+                      <a:headEnd type="none" w="med" len="med"/>
+                      <a:tailEnd type="none" w="med" len="med"/>
+                    </a:lnT>
+                    <a:lnB w="12700" cap="flat" cmpd="sng" algn="ctr">
+                      <a:solidFill>
+                        <a:schemeClr val="tx1"/>
+                      </a:solidFill>
+                      <a:prstDash val="solid"/>
+                      <a:round/>
+                      <a:headEnd type="none" w="med" len="med"/>
+                      <a:tailEnd type="none" w="med" len="med"/>
+                    </a:lnB>
+                    <a:solidFill>
+                      <a:schemeClr val="tx2">
+                        <a:lumMod val="40000"/>
+                        <a:lumOff val="60000"/>
+                      </a:schemeClr>
+                    </a:solidFill>
+                  </a:tcPr>
+                </a:tc>
+              </a:tr>
+              <a:tr h="370840">
+                <a:tc>
+                  <a:txBody>
+                    <a:bodyPr/>
+                    <a:lstStyle/>
+                    <a:p>
+                      <a:r>
+                        <a:rPr lang="en-US" b="0" dirty="0" smtClean="0">
+                          <a:solidFill>
+                            <a:schemeClr val="bg1"/>
+                          </a:solidFill>
+                        </a:rPr>
+                        <a:t>Validation Method</a:t>
+                      </a:r>
+                      <a:endParaRPr lang="en-US" b="0" dirty="0">
+                        <a:solidFill>
+                          <a:schemeClr val="bg1"/>
+                        </a:solidFill>
+                      </a:endParaRPr>
+                    </a:p>
+                  </a:txBody>
+                  <a:tcPr anchor="ctr">
+                    <a:lnL w="12700" cap="flat" cmpd="sng" algn="ctr">
+                      <a:solidFill>
+                        <a:schemeClr val="tx1"/>
+                      </a:solidFill>
+                      <a:prstDash val="solid"/>
+                      <a:round/>
+                      <a:headEnd type="none" w="med" len="med"/>
+                      <a:tailEnd type="none" w="med" len="med"/>
+                    </a:lnL>
+                    <a:lnR w="12700" cap="flat" cmpd="sng" algn="ctr">
+                      <a:solidFill>
+                        <a:schemeClr val="tx1"/>
+                      </a:solidFill>
+                      <a:prstDash val="solid"/>
+                      <a:round/>
+                      <a:headEnd type="none" w="med" len="med"/>
+                      <a:tailEnd type="none" w="med" len="med"/>
+                    </a:lnR>
+                    <a:lnT w="12700" cap="flat" cmpd="sng" algn="ctr">
+                      <a:solidFill>
+                        <a:schemeClr val="tx1"/>
+                      </a:solidFill>
+                      <a:prstDash val="solid"/>
+                      <a:round/>
+                      <a:headEnd type="none" w="med" len="med"/>
+                      <a:tailEnd type="none" w="med" len="med"/>
+                    </a:lnT>
+                    <a:lnB w="12700" cap="flat" cmpd="sng" algn="ctr">
+                      <a:solidFill>
+                        <a:schemeClr val="tx1"/>
+                      </a:solidFill>
+                      <a:prstDash val="solid"/>
+                      <a:round/>
+                      <a:headEnd type="none" w="med" len="med"/>
+                      <a:tailEnd type="none" w="med" len="med"/>
+                    </a:lnB>
+                    <a:solidFill>
+                      <a:schemeClr val="tx2">
+                        <a:lumMod val="75000"/>
+                      </a:schemeClr>
+                    </a:solidFill>
+                  </a:tcPr>
+                </a:tc>
+                <a:tc>
+                  <a:txBody>
+                    <a:bodyPr/>
+                    <a:lstStyle/>
+                    <a:p>
+                      <a:r>
+                        <a:rPr lang="en-US" b="1" i="1" dirty="0" smtClean="0">
+                          <a:solidFill>
+                            <a:schemeClr val="tx1"/>
+                          </a:solidFill>
+                        </a:rPr>
+                        <a:t>Test</a:t>
+                      </a:r>
+                      <a:endParaRPr lang="en-US" b="1" i="1" dirty="0">
+                        <a:solidFill>
+                          <a:schemeClr val="tx1"/>
+                        </a:solidFill>
+                      </a:endParaRPr>
+                    </a:p>
+                  </a:txBody>
+                  <a:tcPr>
+                    <a:lnL w="12700" cap="flat" cmpd="sng" algn="ctr">
+                      <a:solidFill>
+                        <a:schemeClr val="tx1"/>
+                      </a:solidFill>
+                      <a:prstDash val="solid"/>
+                      <a:round/>
+                      <a:headEnd type="none" w="med" len="med"/>
+                      <a:tailEnd type="none" w="med" len="med"/>
+                    </a:lnL>
+                    <a:lnR w="12700" cap="flat" cmpd="sng" algn="ctr">
+                      <a:solidFill>
+                        <a:schemeClr val="tx1"/>
+                      </a:solidFill>
+                      <a:prstDash val="solid"/>
+                      <a:round/>
+                      <a:headEnd type="none" w="med" len="med"/>
+                      <a:tailEnd type="none" w="med" len="med"/>
+                    </a:lnR>
+                    <a:lnT w="12700" cap="flat" cmpd="sng" algn="ctr">
+                      <a:solidFill>
+                        <a:schemeClr val="tx1"/>
+                      </a:solidFill>
+                      <a:prstDash val="solid"/>
+                      <a:round/>
+                      <a:headEnd type="none" w="med" len="med"/>
+                      <a:tailEnd type="none" w="med" len="med"/>
+                    </a:lnT>
+                    <a:lnB w="12700" cap="flat" cmpd="sng" algn="ctr">
+                      <a:solidFill>
+                        <a:schemeClr val="tx1"/>
+                      </a:solidFill>
+                      <a:prstDash val="solid"/>
+                      <a:round/>
+                      <a:headEnd type="none" w="med" len="med"/>
+                      <a:tailEnd type="none" w="med" len="med"/>
+                    </a:lnB>
+                    <a:solidFill>
+                      <a:schemeClr val="tx2">
+                        <a:lumMod val="40000"/>
+                        <a:lumOff val="60000"/>
+                      </a:schemeClr>
+                    </a:solidFill>
+                  </a:tcPr>
+                </a:tc>
+              </a:tr>
+            </a:tbl>
+          </a:graphicData>
+        </a:graphic>
+      </p:graphicFrame>
+      <p:sp>
+        <p:nvSpPr>
+          <p:cNvPr id="5" name="TextBox 4"/>
+          <p:cNvSpPr txBox="1"/>
+          <p:nvPr/>
+        </p:nvSpPr>
+        <p:spPr>
+          <a:xfrm>
+            <a:off x="381000" y="3676471"/>
+            <a:ext cx="5785282" cy="830997"/>
+          </a:xfrm>
+          <a:prstGeom prst="rect">
+            <a:avLst/>
+          </a:prstGeom>
+          <a:noFill/>
+        </p:spPr>
+        <p:txBody>
+          <a:bodyPr wrap="square" rtlCol="0">
+            <a:spAutoFit/>
+          </a:bodyPr>
+          <a:lstStyle/>
+          <a:p>
+            <a:r>
+              <a:rPr lang="en-US" sz="2400" dirty="0" smtClean="0"/>
+              <a:t>Using the GEVS profile covers as many vibration environments </a:t>
+            </a:r>
+            <a:r>
+              <a:rPr lang="en-US" sz="2400" smtClean="0"/>
+              <a:t>as possible.</a:t>
+            </a:r>
+            <a:endParaRPr lang="en-US" sz="2400" dirty="0"/>
+          </a:p>
+        </p:txBody>
+      </p:sp>
+      <p:pic>
+        <p:nvPicPr>
+          <p:cNvPr id="6" name="Picture 5"/>
+          <p:cNvPicPr/>
+          <p:nvPr/>
+        </p:nvPicPr>
+        <p:blipFill>
+          <a:blip r:embed="rId2" cstate="print"/>
+          <a:srcRect t="4045"/>
+          <a:stretch>
+            <a:fillRect/>
+          </a:stretch>
+        </p:blipFill>
+        <p:spPr bwMode="auto">
+          <a:xfrm>
+            <a:off x="6166282" y="2971800"/>
+            <a:ext cx="2667001" cy="2985770"/>
+          </a:xfrm>
+          <a:prstGeom prst="rect">
+            <a:avLst/>
+          </a:prstGeom>
+          <a:noFill/>
+          <a:ln w="9525">
+            <a:solidFill>
+              <a:schemeClr val="tx1"/>
+            </a:solidFill>
+            <a:round/>
+            <a:headEnd/>
+            <a:tailEnd/>
+          </a:ln>
+        </p:spPr>
+      </p:pic>
+    </p:spTree>
+    <p:extLst>
+      <p:ext uri="{BB962C8B-B14F-4D97-AF65-F5344CB8AC3E}">
+        <p14:creationId xmlns:p14="http://schemas.microsoft.com/office/powerpoint/2010/main" val="3473550979"/>
+      </p:ext>
+    </p:extLst>
+  </p:cSld>
+  <p:clrMapOvr>
+    <a:masterClrMapping/>
+  </p:clrMapOvr>
+  <p:timing>
+    <p:tnLst>
+      <p:par>
+        <p:cTn id="1" dur="indefinite" restart="never" nodeType="tmRoot"/>
+      </p:par>
+    </p:tnLst>
+  </p:timing>
 </p:sld>
 </file>
 

</xml_diff>

<commit_message>
Added the rest of the requirements
</commit_message>
<xml_diff>
--- a/CMQA/Presentations/Nate Slides/Nate Slides.pptx
+++ b/CMQA/Presentations/Nate Slides/Nate Slides.pptx
@@ -9,6 +9,10 @@
     <p:sldId id="258" r:id="rId3"/>
     <p:sldId id="259" r:id="rId4"/>
     <p:sldId id="260" r:id="rId5"/>
+    <p:sldId id="261" r:id="rId6"/>
+    <p:sldId id="262" r:id="rId7"/>
+    <p:sldId id="263" r:id="rId8"/>
+    <p:sldId id="264" r:id="rId9"/>
   </p:sldIdLst>
   <p:sldSz cx="9144000" cy="6858000" type="screen4x3"/>
   <p:notesSz cx="6858000" cy="9144000"/>
@@ -293,7 +297,7 @@
               <a:rPr lang="en-US" smtClean="0"/>
               <a:t>11/10/2013</a:t>
             </a:fld>
-            <a:endParaRPr lang="en-US"/>
+            <a:endParaRPr lang="en-US" dirty="0"/>
           </a:p>
         </p:txBody>
       </p:sp>
@@ -312,7 +316,7 @@
           <a:bodyPr/>
           <a:lstStyle/>
           <a:p>
-            <a:endParaRPr lang="en-US"/>
+            <a:endParaRPr lang="en-US" dirty="0"/>
           </a:p>
         </p:txBody>
       </p:sp>
@@ -335,7 +339,7 @@
               <a:rPr lang="en-US" smtClean="0"/>
               <a:t>‹#›</a:t>
             </a:fld>
-            <a:endParaRPr lang="en-US"/>
+            <a:endParaRPr lang="en-US" dirty="0"/>
           </a:p>
         </p:txBody>
       </p:sp>
@@ -463,7 +467,7 @@
               <a:rPr lang="en-US" smtClean="0"/>
               <a:t>11/10/2013</a:t>
             </a:fld>
-            <a:endParaRPr lang="en-US"/>
+            <a:endParaRPr lang="en-US" dirty="0"/>
           </a:p>
         </p:txBody>
       </p:sp>
@@ -482,7 +486,7 @@
           <a:bodyPr/>
           <a:lstStyle/>
           <a:p>
-            <a:endParaRPr lang="en-US"/>
+            <a:endParaRPr lang="en-US" dirty="0"/>
           </a:p>
         </p:txBody>
       </p:sp>
@@ -505,7 +509,7 @@
               <a:rPr lang="en-US" smtClean="0"/>
               <a:t>‹#›</a:t>
             </a:fld>
-            <a:endParaRPr lang="en-US"/>
+            <a:endParaRPr lang="en-US" dirty="0"/>
           </a:p>
         </p:txBody>
       </p:sp>
@@ -643,7 +647,7 @@
               <a:rPr lang="en-US" smtClean="0"/>
               <a:t>11/10/2013</a:t>
             </a:fld>
-            <a:endParaRPr lang="en-US"/>
+            <a:endParaRPr lang="en-US" dirty="0"/>
           </a:p>
         </p:txBody>
       </p:sp>
@@ -662,7 +666,7 @@
           <a:bodyPr/>
           <a:lstStyle/>
           <a:p>
-            <a:endParaRPr lang="en-US"/>
+            <a:endParaRPr lang="en-US" dirty="0"/>
           </a:p>
         </p:txBody>
       </p:sp>
@@ -685,7 +689,7 @@
               <a:rPr lang="en-US" smtClean="0"/>
               <a:t>‹#›</a:t>
             </a:fld>
-            <a:endParaRPr lang="en-US"/>
+            <a:endParaRPr lang="en-US" dirty="0"/>
           </a:p>
         </p:txBody>
       </p:sp>
@@ -813,7 +817,7 @@
               <a:rPr lang="en-US" smtClean="0"/>
               <a:t>11/10/2013</a:t>
             </a:fld>
-            <a:endParaRPr lang="en-US"/>
+            <a:endParaRPr lang="en-US" dirty="0"/>
           </a:p>
         </p:txBody>
       </p:sp>
@@ -832,7 +836,7 @@
           <a:bodyPr/>
           <a:lstStyle/>
           <a:p>
-            <a:endParaRPr lang="en-US"/>
+            <a:endParaRPr lang="en-US" dirty="0"/>
           </a:p>
         </p:txBody>
       </p:sp>
@@ -855,7 +859,7 @@
               <a:rPr lang="en-US" smtClean="0"/>
               <a:t>‹#›</a:t>
             </a:fld>
-            <a:endParaRPr lang="en-US"/>
+            <a:endParaRPr lang="en-US" dirty="0"/>
           </a:p>
         </p:txBody>
       </p:sp>
@@ -1059,7 +1063,7 @@
               <a:rPr lang="en-US" smtClean="0"/>
               <a:t>11/10/2013</a:t>
             </a:fld>
-            <a:endParaRPr lang="en-US"/>
+            <a:endParaRPr lang="en-US" dirty="0"/>
           </a:p>
         </p:txBody>
       </p:sp>
@@ -1078,7 +1082,7 @@
           <a:bodyPr/>
           <a:lstStyle/>
           <a:p>
-            <a:endParaRPr lang="en-US"/>
+            <a:endParaRPr lang="en-US" dirty="0"/>
           </a:p>
         </p:txBody>
       </p:sp>
@@ -1101,7 +1105,7 @@
               <a:rPr lang="en-US" smtClean="0"/>
               <a:t>‹#›</a:t>
             </a:fld>
-            <a:endParaRPr lang="en-US"/>
+            <a:endParaRPr lang="en-US" dirty="0"/>
           </a:p>
         </p:txBody>
       </p:sp>
@@ -1347,7 +1351,7 @@
               <a:rPr lang="en-US" smtClean="0"/>
               <a:t>11/10/2013</a:t>
             </a:fld>
-            <a:endParaRPr lang="en-US"/>
+            <a:endParaRPr lang="en-US" dirty="0"/>
           </a:p>
         </p:txBody>
       </p:sp>
@@ -1366,7 +1370,7 @@
           <a:bodyPr/>
           <a:lstStyle/>
           <a:p>
-            <a:endParaRPr lang="en-US"/>
+            <a:endParaRPr lang="en-US" dirty="0"/>
           </a:p>
         </p:txBody>
       </p:sp>
@@ -1389,7 +1393,7 @@
               <a:rPr lang="en-US" smtClean="0"/>
               <a:t>‹#›</a:t>
             </a:fld>
-            <a:endParaRPr lang="en-US"/>
+            <a:endParaRPr lang="en-US" dirty="0"/>
           </a:p>
         </p:txBody>
       </p:sp>
@@ -1769,7 +1773,7 @@
               <a:rPr lang="en-US" smtClean="0"/>
               <a:t>11/10/2013</a:t>
             </a:fld>
-            <a:endParaRPr lang="en-US"/>
+            <a:endParaRPr lang="en-US" dirty="0"/>
           </a:p>
         </p:txBody>
       </p:sp>
@@ -1788,7 +1792,7 @@
           <a:bodyPr/>
           <a:lstStyle/>
           <a:p>
-            <a:endParaRPr lang="en-US"/>
+            <a:endParaRPr lang="en-US" dirty="0"/>
           </a:p>
         </p:txBody>
       </p:sp>
@@ -1811,7 +1815,7 @@
               <a:rPr lang="en-US" smtClean="0"/>
               <a:t>‹#›</a:t>
             </a:fld>
-            <a:endParaRPr lang="en-US"/>
+            <a:endParaRPr lang="en-US" dirty="0"/>
           </a:p>
         </p:txBody>
       </p:sp>
@@ -1887,7 +1891,7 @@
               <a:rPr lang="en-US" smtClean="0"/>
               <a:t>11/10/2013</a:t>
             </a:fld>
-            <a:endParaRPr lang="en-US"/>
+            <a:endParaRPr lang="en-US" dirty="0"/>
           </a:p>
         </p:txBody>
       </p:sp>
@@ -1906,7 +1910,7 @@
           <a:bodyPr/>
           <a:lstStyle/>
           <a:p>
-            <a:endParaRPr lang="en-US"/>
+            <a:endParaRPr lang="en-US" dirty="0"/>
           </a:p>
         </p:txBody>
       </p:sp>
@@ -1929,7 +1933,7 @@
               <a:rPr lang="en-US" smtClean="0"/>
               <a:t>‹#›</a:t>
             </a:fld>
-            <a:endParaRPr lang="en-US"/>
+            <a:endParaRPr lang="en-US" dirty="0"/>
           </a:p>
         </p:txBody>
       </p:sp>
@@ -1982,7 +1986,7 @@
               <a:rPr lang="en-US" smtClean="0"/>
               <a:t>11/10/2013</a:t>
             </a:fld>
-            <a:endParaRPr lang="en-US"/>
+            <a:endParaRPr lang="en-US" dirty="0"/>
           </a:p>
         </p:txBody>
       </p:sp>
@@ -2001,7 +2005,7 @@
           <a:bodyPr/>
           <a:lstStyle/>
           <a:p>
-            <a:endParaRPr lang="en-US"/>
+            <a:endParaRPr lang="en-US" dirty="0"/>
           </a:p>
         </p:txBody>
       </p:sp>
@@ -2024,7 +2028,7 @@
               <a:rPr lang="en-US" smtClean="0"/>
               <a:t>‹#›</a:t>
             </a:fld>
-            <a:endParaRPr lang="en-US"/>
+            <a:endParaRPr lang="en-US" dirty="0"/>
           </a:p>
         </p:txBody>
       </p:sp>
@@ -2259,7 +2263,7 @@
               <a:rPr lang="en-US" smtClean="0"/>
               <a:t>11/10/2013</a:t>
             </a:fld>
-            <a:endParaRPr lang="en-US"/>
+            <a:endParaRPr lang="en-US" dirty="0"/>
           </a:p>
         </p:txBody>
       </p:sp>
@@ -2278,7 +2282,7 @@
           <a:bodyPr/>
           <a:lstStyle/>
           <a:p>
-            <a:endParaRPr lang="en-US"/>
+            <a:endParaRPr lang="en-US" dirty="0"/>
           </a:p>
         </p:txBody>
       </p:sp>
@@ -2301,7 +2305,7 @@
               <a:rPr lang="en-US" smtClean="0"/>
               <a:t>‹#›</a:t>
             </a:fld>
-            <a:endParaRPr lang="en-US"/>
+            <a:endParaRPr lang="en-US" dirty="0"/>
           </a:p>
         </p:txBody>
       </p:sp>
@@ -2424,7 +2428,7 @@
             </a:lvl9pPr>
           </a:lstStyle>
           <a:p>
-            <a:endParaRPr lang="en-US"/>
+            <a:endParaRPr lang="en-US" dirty="0"/>
           </a:p>
         </p:txBody>
       </p:sp>
@@ -2512,7 +2516,7 @@
               <a:rPr lang="en-US" smtClean="0"/>
               <a:t>11/10/2013</a:t>
             </a:fld>
-            <a:endParaRPr lang="en-US"/>
+            <a:endParaRPr lang="en-US" dirty="0"/>
           </a:p>
         </p:txBody>
       </p:sp>
@@ -2531,7 +2535,7 @@
           <a:bodyPr/>
           <a:lstStyle/>
           <a:p>
-            <a:endParaRPr lang="en-US"/>
+            <a:endParaRPr lang="en-US" dirty="0"/>
           </a:p>
         </p:txBody>
       </p:sp>
@@ -2554,7 +2558,7 @@
               <a:rPr lang="en-US" smtClean="0"/>
               <a:t>‹#›</a:t>
             </a:fld>
-            <a:endParaRPr lang="en-US"/>
+            <a:endParaRPr lang="en-US" dirty="0"/>
           </a:p>
         </p:txBody>
       </p:sp>
@@ -2725,7 +2729,7 @@
               <a:rPr lang="en-US" smtClean="0"/>
               <a:t>11/10/2013</a:t>
             </a:fld>
-            <a:endParaRPr lang="en-US"/>
+            <a:endParaRPr lang="en-US" dirty="0"/>
           </a:p>
         </p:txBody>
       </p:sp>
@@ -2762,7 +2766,7 @@
             </a:lvl1pPr>
           </a:lstStyle>
           <a:p>
-            <a:endParaRPr lang="en-US"/>
+            <a:endParaRPr lang="en-US" dirty="0"/>
           </a:p>
         </p:txBody>
       </p:sp>
@@ -2803,7 +2807,7 @@
               <a:rPr lang="en-US" smtClean="0"/>
               <a:t>‹#›</a:t>
             </a:fld>
-            <a:endParaRPr lang="en-US"/>
+            <a:endParaRPr lang="en-US" dirty="0"/>
           </a:p>
         </p:txBody>
       </p:sp>
@@ -3133,7 +3137,7 @@
             <p:ph idx="1"/>
             <p:extLst>
               <p:ext uri="{D42A27DB-BD31-4B8C-83A1-F6EECF244321}">
-                <p14:modId xmlns:p14="http://schemas.microsoft.com/office/powerpoint/2010/main" val="878666631"/>
+                <p14:modId xmlns:p14="http://schemas.microsoft.com/office/powerpoint/2010/main" val="1757469292"/>
               </p:ext>
             </p:extLst>
           </p:nvPr>
@@ -3228,7 +3232,7 @@
                             <a:schemeClr val="tx1"/>
                           </a:solidFill>
                         </a:rPr>
-                        <a:t>1</a:t>
+                        <a:t>THM1</a:t>
                       </a:r>
                       <a:endParaRPr lang="en-US" b="1" dirty="0">
                         <a:solidFill>
@@ -3367,23 +3371,7 @@
                             <a:schemeClr val="tx1"/>
                           </a:solidFill>
                         </a:rPr>
-                        <a:t>All </a:t>
-                      </a:r>
-                      <a:r>
-                        <a:rPr lang="en-US" b="1" dirty="0" err="1" smtClean="0">
-                          <a:solidFill>
-                            <a:schemeClr val="tx1"/>
-                          </a:solidFill>
-                        </a:rPr>
-                        <a:t>CubeSat</a:t>
-                      </a:r>
-                      <a:r>
-                        <a:rPr lang="en-US" b="1" dirty="0" smtClean="0">
-                          <a:solidFill>
-                            <a:schemeClr val="tx1"/>
-                          </a:solidFill>
-                        </a:rPr>
-                        <a:t> components shall be rated to withstand a temperature range of at least -20 ⁰C to 70 ⁰C</a:t>
+                        <a:t>All CubeSat components shall be rated to withstand a temperature range of at least -20 ⁰C to 70 ⁰C</a:t>
                       </a:r>
                       <a:endParaRPr lang="en-US" b="1" dirty="0">
                         <a:solidFill>
@@ -3679,7 +3667,7 @@
             <p:ph idx="1"/>
             <p:extLst>
               <p:ext uri="{D42A27DB-BD31-4B8C-83A1-F6EECF244321}">
-                <p14:modId xmlns:p14="http://schemas.microsoft.com/office/powerpoint/2010/main" val="3916922255"/>
+                <p14:modId xmlns:p14="http://schemas.microsoft.com/office/powerpoint/2010/main" val="1567101371"/>
               </p:ext>
             </p:extLst>
           </p:nvPr>
@@ -3774,7 +3762,7 @@
                             <a:schemeClr val="tx1"/>
                           </a:solidFill>
                         </a:rPr>
-                        <a:t>2</a:t>
+                        <a:t>PRP2</a:t>
                       </a:r>
                       <a:endParaRPr lang="en-US" b="1" dirty="0">
                         <a:solidFill>
@@ -3913,31 +3901,7 @@
                             <a:schemeClr val="tx1"/>
                           </a:solidFill>
                         </a:rPr>
-                        <a:t>Static Thrust testing will be performed with the flight pressure vessel  prior to </a:t>
-                      </a:r>
-                      <a:r>
-                        <a:rPr lang="en-US" b="1" dirty="0" err="1" smtClean="0">
-                          <a:solidFill>
-                            <a:schemeClr val="tx1"/>
-                          </a:solidFill>
-                        </a:rPr>
-                        <a:t>CubeSat</a:t>
-                      </a:r>
-                      <a:r>
-                        <a:rPr lang="en-US" b="1" dirty="0" smtClean="0">
-                          <a:solidFill>
-                            <a:schemeClr val="tx1"/>
-                          </a:solidFill>
-                        </a:rPr>
-                        <a:t> integration at a pressure no greater than 1x10^-4 </a:t>
-                      </a:r>
-                      <a:r>
-                        <a:rPr lang="en-US" b="1" dirty="0" err="1" smtClean="0">
-                          <a:solidFill>
-                            <a:schemeClr val="tx1"/>
-                          </a:solidFill>
-                        </a:rPr>
-                        <a:t>Torr</a:t>
+                        <a:t>Static Thrust testing will be performed with the flight pressure vessel  prior to CubeSat integration at a pressure no greater than 1x10^-4 Torr</a:t>
                       </a:r>
                       <a:endParaRPr lang="en-US" b="1" dirty="0">
                         <a:solidFill>
@@ -4229,7 +4193,7 @@
             <p:ph idx="1"/>
             <p:extLst>
               <p:ext uri="{D42A27DB-BD31-4B8C-83A1-F6EECF244321}">
-                <p14:modId xmlns:p14="http://schemas.microsoft.com/office/powerpoint/2010/main" val="3032906774"/>
+                <p14:modId xmlns:p14="http://schemas.microsoft.com/office/powerpoint/2010/main" val="1825638766"/>
               </p:ext>
             </p:extLst>
           </p:nvPr>
@@ -4324,7 +4288,7 @@
                             <a:schemeClr val="tx1"/>
                           </a:solidFill>
                         </a:rPr>
-                        <a:t>3</a:t>
+                        <a:t>PRP3</a:t>
                       </a:r>
                       <a:endParaRPr lang="en-US" b="1" dirty="0">
                         <a:solidFill>
@@ -4826,7 +4790,7 @@
             <p:ph idx="1"/>
             <p:extLst>
               <p:ext uri="{D42A27DB-BD31-4B8C-83A1-F6EECF244321}">
-                <p14:modId xmlns:p14="http://schemas.microsoft.com/office/powerpoint/2010/main" val="3263583363"/>
+                <p14:modId xmlns:p14="http://schemas.microsoft.com/office/powerpoint/2010/main" val="2796828356"/>
               </p:ext>
             </p:extLst>
           </p:nvPr>
@@ -4921,7 +4885,7 @@
                             <a:schemeClr val="tx1"/>
                           </a:solidFill>
                         </a:rPr>
-                        <a:t>1</a:t>
+                        <a:t>TST1</a:t>
                       </a:r>
                       <a:endParaRPr lang="en-US" b="1" dirty="0">
                         <a:solidFill>
@@ -5055,20 +5019,12 @@
                     <a:lstStyle/>
                     <a:p>
                       <a:r>
-                        <a:rPr lang="en-US" b="1" dirty="0" err="1" smtClean="0">
-                          <a:solidFill>
-                            <a:schemeClr val="tx1"/>
-                          </a:solidFill>
-                        </a:rPr>
-                        <a:t>CubeSat</a:t>
-                      </a:r>
-                      <a:r>
                         <a:rPr lang="en-US" b="1" dirty="0" smtClean="0">
                           <a:solidFill>
                             <a:schemeClr val="tx1"/>
                           </a:solidFill>
                         </a:rPr>
-                        <a:t> must survive Random Vibration Testing relative to the NASA GEVS Qualification Profile</a:t>
+                        <a:t>CubeSat must survive Random Vibration Testing relative to the NASA GEVS Qualification Profile</a:t>
                       </a:r>
                       <a:endParaRPr lang="en-US" b="1" dirty="0">
                         <a:solidFill>
@@ -5282,11 +5238,7 @@
           <a:p>
             <a:r>
               <a:rPr lang="en-US" sz="2400" dirty="0" smtClean="0"/>
-              <a:t>Using the GEVS profile covers as many vibration environments </a:t>
-            </a:r>
-            <a:r>
-              <a:rPr lang="en-US" sz="2400" smtClean="0"/>
-              <a:t>as possible.</a:t>
+              <a:t>Using the GEVS profile covers as many vibration environments as possible.</a:t>
             </a:r>
             <a:endParaRPr lang="en-US" sz="2400" dirty="0"/>
           </a:p>
@@ -5328,6 +5280,2146 @@
     <p:extLst>
       <p:ext uri="{BB962C8B-B14F-4D97-AF65-F5344CB8AC3E}">
         <p14:creationId xmlns:p14="http://schemas.microsoft.com/office/powerpoint/2010/main" val="3473550979"/>
+      </p:ext>
+    </p:extLst>
+  </p:cSld>
+  <p:clrMapOvr>
+    <a:masterClrMapping/>
+  </p:clrMapOvr>
+  <p:timing>
+    <p:tnLst>
+      <p:par>
+        <p:cTn id="1" dur="indefinite" restart="never" nodeType="tmRoot"/>
+      </p:par>
+    </p:tnLst>
+  </p:timing>
+</p:sld>
+</file>
+
+<file path=ppt/slides/slide5.xml><?xml version="1.0" encoding="utf-8"?>
+<p:sld xmlns:a="http://schemas.openxmlformats.org/drawingml/2006/main" xmlns:r="http://schemas.openxmlformats.org/officeDocument/2006/relationships" xmlns:p="http://schemas.openxmlformats.org/presentationml/2006/main">
+  <p:cSld>
+    <p:spTree>
+      <p:nvGrpSpPr>
+        <p:cNvPr id="1" name=""/>
+        <p:cNvGrpSpPr/>
+        <p:nvPr/>
+      </p:nvGrpSpPr>
+      <p:grpSpPr>
+        <a:xfrm>
+          <a:off x="0" y="0"/>
+          <a:ext cx="0" cy="0"/>
+          <a:chOff x="0" y="0"/>
+          <a:chExt cx="0" cy="0"/>
+        </a:xfrm>
+      </p:grpSpPr>
+      <p:sp>
+        <p:nvSpPr>
+          <p:cNvPr id="2" name="Title 1"/>
+          <p:cNvSpPr>
+            <a:spLocks noGrp="1"/>
+          </p:cNvSpPr>
+          <p:nvPr>
+            <p:ph type="title"/>
+          </p:nvPr>
+        </p:nvSpPr>
+        <p:spPr/>
+        <p:txBody>
+          <a:bodyPr>
+            <a:normAutofit/>
+          </a:bodyPr>
+          <a:lstStyle/>
+          <a:p>
+            <a:r>
+              <a:rPr lang="en-US" i="1" dirty="0" smtClean="0"/>
+              <a:t>RCL.PL.TST2</a:t>
+            </a:r>
+            <a:endParaRPr lang="en-US" i="1" dirty="0"/>
+          </a:p>
+        </p:txBody>
+      </p:sp>
+      <p:graphicFrame>
+        <p:nvGraphicFramePr>
+          <p:cNvPr id="4" name="Content Placeholder 3"/>
+          <p:cNvGraphicFramePr>
+            <a:graphicFrameLocks noGrp="1"/>
+          </p:cNvGraphicFramePr>
+          <p:nvPr>
+            <p:ph idx="1"/>
+            <p:extLst>
+              <p:ext uri="{D42A27DB-BD31-4B8C-83A1-F6EECF244321}">
+                <p14:modId xmlns:p14="http://schemas.microsoft.com/office/powerpoint/2010/main" val="2184195338"/>
+              </p:ext>
+            </p:extLst>
+          </p:nvPr>
+        </p:nvGraphicFramePr>
+        <p:xfrm>
+          <a:off x="457200" y="1371600"/>
+          <a:ext cx="8229600" cy="1656080"/>
+        </p:xfrm>
+        <a:graphic>
+          <a:graphicData uri="http://schemas.openxmlformats.org/drawingml/2006/table">
+            <a:tbl>
+              <a:tblPr firstRow="1" bandRow="1">
+                <a:tableStyleId>{5C22544A-7EE6-4342-B048-85BDC9FD1C3A}</a:tableStyleId>
+              </a:tblPr>
+              <a:tblGrid>
+                <a:gridCol w="3200400"/>
+                <a:gridCol w="5029200"/>
+              </a:tblGrid>
+              <a:tr h="370840">
+                <a:tc>
+                  <a:txBody>
+                    <a:bodyPr/>
+                    <a:lstStyle/>
+                    <a:p>
+                      <a:r>
+                        <a:rPr lang="en-US" b="0" dirty="0" smtClean="0">
+                          <a:solidFill>
+                            <a:schemeClr val="bg1"/>
+                          </a:solidFill>
+                        </a:rPr>
+                        <a:t> RVM Requirement Number</a:t>
+                      </a:r>
+                      <a:endParaRPr lang="en-US" b="0" dirty="0">
+                        <a:solidFill>
+                          <a:schemeClr val="bg1"/>
+                        </a:solidFill>
+                      </a:endParaRPr>
+                    </a:p>
+                  </a:txBody>
+                  <a:tcPr anchor="ctr">
+                    <a:lnL w="12700" cap="flat" cmpd="sng" algn="ctr">
+                      <a:solidFill>
+                        <a:schemeClr val="tx1"/>
+                      </a:solidFill>
+                      <a:prstDash val="solid"/>
+                      <a:round/>
+                      <a:headEnd type="none" w="med" len="med"/>
+                      <a:tailEnd type="none" w="med" len="med"/>
+                    </a:lnL>
+                    <a:lnR w="12700" cap="flat" cmpd="sng" algn="ctr">
+                      <a:solidFill>
+                        <a:schemeClr val="tx1"/>
+                      </a:solidFill>
+                      <a:prstDash val="solid"/>
+                      <a:round/>
+                      <a:headEnd type="none" w="med" len="med"/>
+                      <a:tailEnd type="none" w="med" len="med"/>
+                    </a:lnR>
+                    <a:lnT w="12700" cap="flat" cmpd="sng" algn="ctr">
+                      <a:solidFill>
+                        <a:schemeClr val="tx1"/>
+                      </a:solidFill>
+                      <a:prstDash val="solid"/>
+                      <a:round/>
+                      <a:headEnd type="none" w="med" len="med"/>
+                      <a:tailEnd type="none" w="med" len="med"/>
+                    </a:lnT>
+                    <a:lnB w="12700" cap="flat" cmpd="sng" algn="ctr">
+                      <a:solidFill>
+                        <a:schemeClr val="tx1"/>
+                      </a:solidFill>
+                      <a:prstDash val="solid"/>
+                      <a:round/>
+                      <a:headEnd type="none" w="med" len="med"/>
+                      <a:tailEnd type="none" w="med" len="med"/>
+                    </a:lnB>
+                    <a:solidFill>
+                      <a:schemeClr val="tx2">
+                        <a:lumMod val="75000"/>
+                      </a:schemeClr>
+                    </a:solidFill>
+                  </a:tcPr>
+                </a:tc>
+                <a:tc>
+                  <a:txBody>
+                    <a:bodyPr/>
+                    <a:lstStyle/>
+                    <a:p>
+                      <a:r>
+                        <a:rPr lang="en-US" b="1" dirty="0" smtClean="0">
+                          <a:solidFill>
+                            <a:schemeClr val="tx1"/>
+                          </a:solidFill>
+                        </a:rPr>
+                        <a:t>TST2</a:t>
+                      </a:r>
+                      <a:endParaRPr lang="en-US" b="1" dirty="0">
+                        <a:solidFill>
+                          <a:schemeClr val="tx1"/>
+                        </a:solidFill>
+                      </a:endParaRPr>
+                    </a:p>
+                  </a:txBody>
+                  <a:tcPr>
+                    <a:lnL w="12700" cap="flat" cmpd="sng" algn="ctr">
+                      <a:solidFill>
+                        <a:schemeClr val="tx1"/>
+                      </a:solidFill>
+                      <a:prstDash val="solid"/>
+                      <a:round/>
+                      <a:headEnd type="none" w="med" len="med"/>
+                      <a:tailEnd type="none" w="med" len="med"/>
+                    </a:lnL>
+                    <a:lnR w="12700" cap="flat" cmpd="sng" algn="ctr">
+                      <a:solidFill>
+                        <a:schemeClr val="tx1"/>
+                      </a:solidFill>
+                      <a:prstDash val="solid"/>
+                      <a:round/>
+                      <a:headEnd type="none" w="med" len="med"/>
+                      <a:tailEnd type="none" w="med" len="med"/>
+                    </a:lnR>
+                    <a:lnT w="12700" cap="flat" cmpd="sng" algn="ctr">
+                      <a:solidFill>
+                        <a:schemeClr val="tx1"/>
+                      </a:solidFill>
+                      <a:prstDash val="solid"/>
+                      <a:round/>
+                      <a:headEnd type="none" w="med" len="med"/>
+                      <a:tailEnd type="none" w="med" len="med"/>
+                    </a:lnT>
+                    <a:lnB w="12700" cap="flat" cmpd="sng" algn="ctr">
+                      <a:solidFill>
+                        <a:schemeClr val="tx1"/>
+                      </a:solidFill>
+                      <a:prstDash val="solid"/>
+                      <a:round/>
+                      <a:headEnd type="none" w="med" len="med"/>
+                      <a:tailEnd type="none" w="med" len="med"/>
+                    </a:lnB>
+                    <a:solidFill>
+                      <a:schemeClr val="tx2">
+                        <a:lumMod val="40000"/>
+                        <a:lumOff val="60000"/>
+                      </a:schemeClr>
+                    </a:solidFill>
+                  </a:tcPr>
+                </a:tc>
+              </a:tr>
+              <a:tr h="370840">
+                <a:tc>
+                  <a:txBody>
+                    <a:bodyPr/>
+                    <a:lstStyle/>
+                    <a:p>
+                      <a:r>
+                        <a:rPr lang="en-US" b="0" dirty="0" smtClean="0">
+                          <a:solidFill>
+                            <a:schemeClr val="bg1"/>
+                          </a:solidFill>
+                        </a:rPr>
+                        <a:t>RVM </a:t>
+                      </a:r>
+                      <a:r>
+                        <a:rPr lang="en-US" b="0" baseline="0" dirty="0" smtClean="0">
+                          <a:solidFill>
+                            <a:schemeClr val="bg1"/>
+                          </a:solidFill>
+                        </a:rPr>
+                        <a:t>Requirement Wording</a:t>
+                      </a:r>
+                      <a:endParaRPr lang="en-US" b="0" dirty="0">
+                        <a:solidFill>
+                          <a:schemeClr val="bg1"/>
+                        </a:solidFill>
+                      </a:endParaRPr>
+                    </a:p>
+                  </a:txBody>
+                  <a:tcPr anchor="ctr">
+                    <a:lnL w="12700" cap="flat" cmpd="sng" algn="ctr">
+                      <a:solidFill>
+                        <a:schemeClr val="tx1"/>
+                      </a:solidFill>
+                      <a:prstDash val="solid"/>
+                      <a:round/>
+                      <a:headEnd type="none" w="med" len="med"/>
+                      <a:tailEnd type="none" w="med" len="med"/>
+                    </a:lnL>
+                    <a:lnR w="12700" cap="flat" cmpd="sng" algn="ctr">
+                      <a:solidFill>
+                        <a:schemeClr val="tx1"/>
+                      </a:solidFill>
+                      <a:prstDash val="solid"/>
+                      <a:round/>
+                      <a:headEnd type="none" w="med" len="med"/>
+                      <a:tailEnd type="none" w="med" len="med"/>
+                    </a:lnR>
+                    <a:lnT w="12700" cap="flat" cmpd="sng" algn="ctr">
+                      <a:solidFill>
+                        <a:schemeClr val="tx1"/>
+                      </a:solidFill>
+                      <a:prstDash val="solid"/>
+                      <a:round/>
+                      <a:headEnd type="none" w="med" len="med"/>
+                      <a:tailEnd type="none" w="med" len="med"/>
+                    </a:lnT>
+                    <a:lnB w="12700" cap="flat" cmpd="sng" algn="ctr">
+                      <a:solidFill>
+                        <a:schemeClr val="tx1"/>
+                      </a:solidFill>
+                      <a:prstDash val="solid"/>
+                      <a:round/>
+                      <a:headEnd type="none" w="med" len="med"/>
+                      <a:tailEnd type="none" w="med" len="med"/>
+                    </a:lnB>
+                    <a:solidFill>
+                      <a:schemeClr val="tx2">
+                        <a:lumMod val="75000"/>
+                      </a:schemeClr>
+                    </a:solidFill>
+                  </a:tcPr>
+                </a:tc>
+                <a:tc>
+                  <a:txBody>
+                    <a:bodyPr/>
+                    <a:lstStyle/>
+                    <a:p>
+                      <a:r>
+                        <a:rPr lang="en-US" b="1" dirty="0" smtClean="0">
+                          <a:solidFill>
+                            <a:schemeClr val="tx1"/>
+                          </a:solidFill>
+                        </a:rPr>
+                        <a:t>CubeSat shall be subjected to a temperature of</a:t>
+                      </a:r>
+                      <a:r>
+                        <a:rPr lang="en-US" b="1" baseline="0" dirty="0" smtClean="0">
+                          <a:solidFill>
+                            <a:schemeClr val="tx1"/>
+                          </a:solidFill>
+                        </a:rPr>
+                        <a:t>    </a:t>
+                      </a:r>
+                      <a:r>
+                        <a:rPr lang="en-US" b="1" dirty="0" smtClean="0">
+                          <a:solidFill>
+                            <a:schemeClr val="tx1"/>
+                          </a:solidFill>
+                        </a:rPr>
+                        <a:t>60 ⁰C at a pressure of 1x10^-4 Torr for at least 6 hours </a:t>
+                      </a:r>
+                      <a:endParaRPr lang="en-US" b="1" dirty="0">
+                        <a:solidFill>
+                          <a:schemeClr val="tx1"/>
+                        </a:solidFill>
+                      </a:endParaRPr>
+                    </a:p>
+                  </a:txBody>
+                  <a:tcPr>
+                    <a:lnL w="12700" cap="flat" cmpd="sng" algn="ctr">
+                      <a:solidFill>
+                        <a:schemeClr val="tx1"/>
+                      </a:solidFill>
+                      <a:prstDash val="solid"/>
+                      <a:round/>
+                      <a:headEnd type="none" w="med" len="med"/>
+                      <a:tailEnd type="none" w="med" len="med"/>
+                    </a:lnL>
+                    <a:lnR w="12700" cap="flat" cmpd="sng" algn="ctr">
+                      <a:solidFill>
+                        <a:schemeClr val="tx1"/>
+                      </a:solidFill>
+                      <a:prstDash val="solid"/>
+                      <a:round/>
+                      <a:headEnd type="none" w="med" len="med"/>
+                      <a:tailEnd type="none" w="med" len="med"/>
+                    </a:lnR>
+                    <a:lnT w="12700" cap="flat" cmpd="sng" algn="ctr">
+                      <a:solidFill>
+                        <a:schemeClr val="tx1"/>
+                      </a:solidFill>
+                      <a:prstDash val="solid"/>
+                      <a:round/>
+                      <a:headEnd type="none" w="med" len="med"/>
+                      <a:tailEnd type="none" w="med" len="med"/>
+                    </a:lnT>
+                    <a:lnB w="12700" cap="flat" cmpd="sng" algn="ctr">
+                      <a:solidFill>
+                        <a:schemeClr val="tx1"/>
+                      </a:solidFill>
+                      <a:prstDash val="solid"/>
+                      <a:round/>
+                      <a:headEnd type="none" w="med" len="med"/>
+                      <a:tailEnd type="none" w="med" len="med"/>
+                    </a:lnB>
+                    <a:solidFill>
+                      <a:schemeClr val="tx2">
+                        <a:lumMod val="40000"/>
+                        <a:lumOff val="60000"/>
+                      </a:schemeClr>
+                    </a:solidFill>
+                  </a:tcPr>
+                </a:tc>
+              </a:tr>
+              <a:tr h="370840">
+                <a:tc>
+                  <a:txBody>
+                    <a:bodyPr/>
+                    <a:lstStyle/>
+                    <a:p>
+                      <a:r>
+                        <a:rPr lang="en-US" b="0" dirty="0" smtClean="0">
+                          <a:solidFill>
+                            <a:schemeClr val="bg1"/>
+                          </a:solidFill>
+                        </a:rPr>
+                        <a:t>Validation Method</a:t>
+                      </a:r>
+                      <a:endParaRPr lang="en-US" b="0" dirty="0">
+                        <a:solidFill>
+                          <a:schemeClr val="bg1"/>
+                        </a:solidFill>
+                      </a:endParaRPr>
+                    </a:p>
+                  </a:txBody>
+                  <a:tcPr anchor="ctr">
+                    <a:lnL w="12700" cap="flat" cmpd="sng" algn="ctr">
+                      <a:solidFill>
+                        <a:schemeClr val="tx1"/>
+                      </a:solidFill>
+                      <a:prstDash val="solid"/>
+                      <a:round/>
+                      <a:headEnd type="none" w="med" len="med"/>
+                      <a:tailEnd type="none" w="med" len="med"/>
+                    </a:lnL>
+                    <a:lnR w="12700" cap="flat" cmpd="sng" algn="ctr">
+                      <a:solidFill>
+                        <a:schemeClr val="tx1"/>
+                      </a:solidFill>
+                      <a:prstDash val="solid"/>
+                      <a:round/>
+                      <a:headEnd type="none" w="med" len="med"/>
+                      <a:tailEnd type="none" w="med" len="med"/>
+                    </a:lnR>
+                    <a:lnT w="12700" cap="flat" cmpd="sng" algn="ctr">
+                      <a:solidFill>
+                        <a:schemeClr val="tx1"/>
+                      </a:solidFill>
+                      <a:prstDash val="solid"/>
+                      <a:round/>
+                      <a:headEnd type="none" w="med" len="med"/>
+                      <a:tailEnd type="none" w="med" len="med"/>
+                    </a:lnT>
+                    <a:lnB w="12700" cap="flat" cmpd="sng" algn="ctr">
+                      <a:solidFill>
+                        <a:schemeClr val="tx1"/>
+                      </a:solidFill>
+                      <a:prstDash val="solid"/>
+                      <a:round/>
+                      <a:headEnd type="none" w="med" len="med"/>
+                      <a:tailEnd type="none" w="med" len="med"/>
+                    </a:lnB>
+                    <a:solidFill>
+                      <a:schemeClr val="tx2">
+                        <a:lumMod val="75000"/>
+                      </a:schemeClr>
+                    </a:solidFill>
+                  </a:tcPr>
+                </a:tc>
+                <a:tc>
+                  <a:txBody>
+                    <a:bodyPr/>
+                    <a:lstStyle/>
+                    <a:p>
+                      <a:r>
+                        <a:rPr lang="en-US" b="1" i="1" dirty="0" smtClean="0">
+                          <a:solidFill>
+                            <a:schemeClr val="tx1"/>
+                          </a:solidFill>
+                        </a:rPr>
+                        <a:t>Test</a:t>
+                      </a:r>
+                      <a:endParaRPr lang="en-US" b="1" i="1" dirty="0">
+                        <a:solidFill>
+                          <a:schemeClr val="tx1"/>
+                        </a:solidFill>
+                      </a:endParaRPr>
+                    </a:p>
+                  </a:txBody>
+                  <a:tcPr>
+                    <a:lnL w="12700" cap="flat" cmpd="sng" algn="ctr">
+                      <a:solidFill>
+                        <a:schemeClr val="tx1"/>
+                      </a:solidFill>
+                      <a:prstDash val="solid"/>
+                      <a:round/>
+                      <a:headEnd type="none" w="med" len="med"/>
+                      <a:tailEnd type="none" w="med" len="med"/>
+                    </a:lnL>
+                    <a:lnR w="12700" cap="flat" cmpd="sng" algn="ctr">
+                      <a:solidFill>
+                        <a:schemeClr val="tx1"/>
+                      </a:solidFill>
+                      <a:prstDash val="solid"/>
+                      <a:round/>
+                      <a:headEnd type="none" w="med" len="med"/>
+                      <a:tailEnd type="none" w="med" len="med"/>
+                    </a:lnR>
+                    <a:lnT w="12700" cap="flat" cmpd="sng" algn="ctr">
+                      <a:solidFill>
+                        <a:schemeClr val="tx1"/>
+                      </a:solidFill>
+                      <a:prstDash val="solid"/>
+                      <a:round/>
+                      <a:headEnd type="none" w="med" len="med"/>
+                      <a:tailEnd type="none" w="med" len="med"/>
+                    </a:lnT>
+                    <a:lnB w="12700" cap="flat" cmpd="sng" algn="ctr">
+                      <a:solidFill>
+                        <a:schemeClr val="tx1"/>
+                      </a:solidFill>
+                      <a:prstDash val="solid"/>
+                      <a:round/>
+                      <a:headEnd type="none" w="med" len="med"/>
+                      <a:tailEnd type="none" w="med" len="med"/>
+                    </a:lnB>
+                    <a:solidFill>
+                      <a:schemeClr val="tx2">
+                        <a:lumMod val="40000"/>
+                        <a:lumOff val="60000"/>
+                      </a:schemeClr>
+                    </a:solidFill>
+                  </a:tcPr>
+                </a:tc>
+              </a:tr>
+            </a:tbl>
+          </a:graphicData>
+        </a:graphic>
+      </p:graphicFrame>
+      <p:sp>
+        <p:nvSpPr>
+          <p:cNvPr id="5" name="TextBox 4"/>
+          <p:cNvSpPr txBox="1"/>
+          <p:nvPr/>
+        </p:nvSpPr>
+        <p:spPr>
+          <a:xfrm>
+            <a:off x="381000" y="3676471"/>
+            <a:ext cx="8305800" cy="1200329"/>
+          </a:xfrm>
+          <a:prstGeom prst="rect">
+            <a:avLst/>
+          </a:prstGeom>
+          <a:noFill/>
+        </p:spPr>
+        <p:txBody>
+          <a:bodyPr wrap="square" rtlCol="0">
+            <a:spAutoFit/>
+          </a:bodyPr>
+          <a:lstStyle/>
+          <a:p>
+            <a:r>
+              <a:rPr lang="en-US" sz="2400" dirty="0" smtClean="0"/>
+              <a:t>This is called a bakeout and its purpose is to remove volatile material from the CubeSat system so it does not damage nearby spacecraft.</a:t>
+            </a:r>
+            <a:endParaRPr lang="en-US" sz="2400" dirty="0"/>
+          </a:p>
+        </p:txBody>
+      </p:sp>
+    </p:spTree>
+    <p:extLst>
+      <p:ext uri="{BB962C8B-B14F-4D97-AF65-F5344CB8AC3E}">
+        <p14:creationId xmlns:p14="http://schemas.microsoft.com/office/powerpoint/2010/main" val="2398931334"/>
+      </p:ext>
+    </p:extLst>
+  </p:cSld>
+  <p:clrMapOvr>
+    <a:masterClrMapping/>
+  </p:clrMapOvr>
+  <p:timing>
+    <p:tnLst>
+      <p:par>
+        <p:cTn id="1" dur="indefinite" restart="never" nodeType="tmRoot"/>
+      </p:par>
+    </p:tnLst>
+  </p:timing>
+</p:sld>
+</file>
+
+<file path=ppt/slides/slide6.xml><?xml version="1.0" encoding="utf-8"?>
+<p:sld xmlns:a="http://schemas.openxmlformats.org/drawingml/2006/main" xmlns:r="http://schemas.openxmlformats.org/officeDocument/2006/relationships" xmlns:p="http://schemas.openxmlformats.org/presentationml/2006/main">
+  <p:cSld>
+    <p:spTree>
+      <p:nvGrpSpPr>
+        <p:cNvPr id="1" name=""/>
+        <p:cNvGrpSpPr/>
+        <p:nvPr/>
+      </p:nvGrpSpPr>
+      <p:grpSpPr>
+        <a:xfrm>
+          <a:off x="0" y="0"/>
+          <a:ext cx="0" cy="0"/>
+          <a:chOff x="0" y="0"/>
+          <a:chExt cx="0" cy="0"/>
+        </a:xfrm>
+      </p:grpSpPr>
+      <p:sp>
+        <p:nvSpPr>
+          <p:cNvPr id="2" name="Title 1"/>
+          <p:cNvSpPr>
+            <a:spLocks noGrp="1"/>
+          </p:cNvSpPr>
+          <p:nvPr>
+            <p:ph type="title"/>
+          </p:nvPr>
+        </p:nvSpPr>
+        <p:spPr/>
+        <p:txBody>
+          <a:bodyPr>
+            <a:normAutofit/>
+          </a:bodyPr>
+          <a:lstStyle/>
+          <a:p>
+            <a:r>
+              <a:rPr lang="en-US" i="1" dirty="0" smtClean="0"/>
+              <a:t>RCL.PL.TST3</a:t>
+            </a:r>
+            <a:endParaRPr lang="en-US" i="1" dirty="0"/>
+          </a:p>
+        </p:txBody>
+      </p:sp>
+      <p:graphicFrame>
+        <p:nvGraphicFramePr>
+          <p:cNvPr id="4" name="Content Placeholder 3"/>
+          <p:cNvGraphicFramePr>
+            <a:graphicFrameLocks noGrp="1"/>
+          </p:cNvGraphicFramePr>
+          <p:nvPr>
+            <p:ph idx="1"/>
+            <p:extLst>
+              <p:ext uri="{D42A27DB-BD31-4B8C-83A1-F6EECF244321}">
+                <p14:modId xmlns:p14="http://schemas.microsoft.com/office/powerpoint/2010/main" val="2151132394"/>
+              </p:ext>
+            </p:extLst>
+          </p:nvPr>
+        </p:nvGraphicFramePr>
+        <p:xfrm>
+          <a:off x="457200" y="1371600"/>
+          <a:ext cx="8229600" cy="1381760"/>
+        </p:xfrm>
+        <a:graphic>
+          <a:graphicData uri="http://schemas.openxmlformats.org/drawingml/2006/table">
+            <a:tbl>
+              <a:tblPr firstRow="1" bandRow="1">
+                <a:tableStyleId>{5C22544A-7EE6-4342-B048-85BDC9FD1C3A}</a:tableStyleId>
+              </a:tblPr>
+              <a:tblGrid>
+                <a:gridCol w="3200400"/>
+                <a:gridCol w="5029200"/>
+              </a:tblGrid>
+              <a:tr h="370840">
+                <a:tc>
+                  <a:txBody>
+                    <a:bodyPr/>
+                    <a:lstStyle/>
+                    <a:p>
+                      <a:r>
+                        <a:rPr lang="en-US" b="0" dirty="0" smtClean="0">
+                          <a:solidFill>
+                            <a:schemeClr val="bg1"/>
+                          </a:solidFill>
+                        </a:rPr>
+                        <a:t> RVM Requirement Number</a:t>
+                      </a:r>
+                      <a:endParaRPr lang="en-US" b="0" dirty="0">
+                        <a:solidFill>
+                          <a:schemeClr val="bg1"/>
+                        </a:solidFill>
+                      </a:endParaRPr>
+                    </a:p>
+                  </a:txBody>
+                  <a:tcPr anchor="ctr">
+                    <a:lnL w="12700" cap="flat" cmpd="sng" algn="ctr">
+                      <a:solidFill>
+                        <a:schemeClr val="tx1"/>
+                      </a:solidFill>
+                      <a:prstDash val="solid"/>
+                      <a:round/>
+                      <a:headEnd type="none" w="med" len="med"/>
+                      <a:tailEnd type="none" w="med" len="med"/>
+                    </a:lnL>
+                    <a:lnR w="12700" cap="flat" cmpd="sng" algn="ctr">
+                      <a:solidFill>
+                        <a:schemeClr val="tx1"/>
+                      </a:solidFill>
+                      <a:prstDash val="solid"/>
+                      <a:round/>
+                      <a:headEnd type="none" w="med" len="med"/>
+                      <a:tailEnd type="none" w="med" len="med"/>
+                    </a:lnR>
+                    <a:lnT w="12700" cap="flat" cmpd="sng" algn="ctr">
+                      <a:solidFill>
+                        <a:schemeClr val="tx1"/>
+                      </a:solidFill>
+                      <a:prstDash val="solid"/>
+                      <a:round/>
+                      <a:headEnd type="none" w="med" len="med"/>
+                      <a:tailEnd type="none" w="med" len="med"/>
+                    </a:lnT>
+                    <a:lnB w="12700" cap="flat" cmpd="sng" algn="ctr">
+                      <a:solidFill>
+                        <a:schemeClr val="tx1"/>
+                      </a:solidFill>
+                      <a:prstDash val="solid"/>
+                      <a:round/>
+                      <a:headEnd type="none" w="med" len="med"/>
+                      <a:tailEnd type="none" w="med" len="med"/>
+                    </a:lnB>
+                    <a:solidFill>
+                      <a:schemeClr val="tx2">
+                        <a:lumMod val="75000"/>
+                      </a:schemeClr>
+                    </a:solidFill>
+                  </a:tcPr>
+                </a:tc>
+                <a:tc>
+                  <a:txBody>
+                    <a:bodyPr/>
+                    <a:lstStyle/>
+                    <a:p>
+                      <a:r>
+                        <a:rPr lang="en-US" b="1" dirty="0" smtClean="0">
+                          <a:solidFill>
+                            <a:schemeClr val="tx1"/>
+                          </a:solidFill>
+                        </a:rPr>
+                        <a:t>TST3</a:t>
+                      </a:r>
+                      <a:endParaRPr lang="en-US" b="1" dirty="0">
+                        <a:solidFill>
+                          <a:schemeClr val="tx1"/>
+                        </a:solidFill>
+                      </a:endParaRPr>
+                    </a:p>
+                  </a:txBody>
+                  <a:tcPr>
+                    <a:lnL w="12700" cap="flat" cmpd="sng" algn="ctr">
+                      <a:solidFill>
+                        <a:schemeClr val="tx1"/>
+                      </a:solidFill>
+                      <a:prstDash val="solid"/>
+                      <a:round/>
+                      <a:headEnd type="none" w="med" len="med"/>
+                      <a:tailEnd type="none" w="med" len="med"/>
+                    </a:lnL>
+                    <a:lnR w="12700" cap="flat" cmpd="sng" algn="ctr">
+                      <a:solidFill>
+                        <a:schemeClr val="tx1"/>
+                      </a:solidFill>
+                      <a:prstDash val="solid"/>
+                      <a:round/>
+                      <a:headEnd type="none" w="med" len="med"/>
+                      <a:tailEnd type="none" w="med" len="med"/>
+                    </a:lnR>
+                    <a:lnT w="12700" cap="flat" cmpd="sng" algn="ctr">
+                      <a:solidFill>
+                        <a:schemeClr val="tx1"/>
+                      </a:solidFill>
+                      <a:prstDash val="solid"/>
+                      <a:round/>
+                      <a:headEnd type="none" w="med" len="med"/>
+                      <a:tailEnd type="none" w="med" len="med"/>
+                    </a:lnT>
+                    <a:lnB w="12700" cap="flat" cmpd="sng" algn="ctr">
+                      <a:solidFill>
+                        <a:schemeClr val="tx1"/>
+                      </a:solidFill>
+                      <a:prstDash val="solid"/>
+                      <a:round/>
+                      <a:headEnd type="none" w="med" len="med"/>
+                      <a:tailEnd type="none" w="med" len="med"/>
+                    </a:lnB>
+                    <a:solidFill>
+                      <a:schemeClr val="tx2">
+                        <a:lumMod val="40000"/>
+                        <a:lumOff val="60000"/>
+                      </a:schemeClr>
+                    </a:solidFill>
+                  </a:tcPr>
+                </a:tc>
+              </a:tr>
+              <a:tr h="370840">
+                <a:tc>
+                  <a:txBody>
+                    <a:bodyPr/>
+                    <a:lstStyle/>
+                    <a:p>
+                      <a:r>
+                        <a:rPr lang="en-US" b="0" dirty="0" smtClean="0">
+                          <a:solidFill>
+                            <a:schemeClr val="bg1"/>
+                          </a:solidFill>
+                        </a:rPr>
+                        <a:t>RVM </a:t>
+                      </a:r>
+                      <a:r>
+                        <a:rPr lang="en-US" b="0" baseline="0" dirty="0" smtClean="0">
+                          <a:solidFill>
+                            <a:schemeClr val="bg1"/>
+                          </a:solidFill>
+                        </a:rPr>
+                        <a:t>Requirement Wording</a:t>
+                      </a:r>
+                      <a:endParaRPr lang="en-US" b="0" dirty="0">
+                        <a:solidFill>
+                          <a:schemeClr val="bg1"/>
+                        </a:solidFill>
+                      </a:endParaRPr>
+                    </a:p>
+                  </a:txBody>
+                  <a:tcPr anchor="ctr">
+                    <a:lnL w="12700" cap="flat" cmpd="sng" algn="ctr">
+                      <a:solidFill>
+                        <a:schemeClr val="tx1"/>
+                      </a:solidFill>
+                      <a:prstDash val="solid"/>
+                      <a:round/>
+                      <a:headEnd type="none" w="med" len="med"/>
+                      <a:tailEnd type="none" w="med" len="med"/>
+                    </a:lnL>
+                    <a:lnR w="12700" cap="flat" cmpd="sng" algn="ctr">
+                      <a:solidFill>
+                        <a:schemeClr val="tx1"/>
+                      </a:solidFill>
+                      <a:prstDash val="solid"/>
+                      <a:round/>
+                      <a:headEnd type="none" w="med" len="med"/>
+                      <a:tailEnd type="none" w="med" len="med"/>
+                    </a:lnR>
+                    <a:lnT w="12700" cap="flat" cmpd="sng" algn="ctr">
+                      <a:solidFill>
+                        <a:schemeClr val="tx1"/>
+                      </a:solidFill>
+                      <a:prstDash val="solid"/>
+                      <a:round/>
+                      <a:headEnd type="none" w="med" len="med"/>
+                      <a:tailEnd type="none" w="med" len="med"/>
+                    </a:lnT>
+                    <a:lnB w="12700" cap="flat" cmpd="sng" algn="ctr">
+                      <a:solidFill>
+                        <a:schemeClr val="tx1"/>
+                      </a:solidFill>
+                      <a:prstDash val="solid"/>
+                      <a:round/>
+                      <a:headEnd type="none" w="med" len="med"/>
+                      <a:tailEnd type="none" w="med" len="med"/>
+                    </a:lnB>
+                    <a:solidFill>
+                      <a:schemeClr val="tx2">
+                        <a:lumMod val="75000"/>
+                      </a:schemeClr>
+                    </a:solidFill>
+                  </a:tcPr>
+                </a:tc>
+                <a:tc>
+                  <a:txBody>
+                    <a:bodyPr/>
+                    <a:lstStyle/>
+                    <a:p>
+                      <a:r>
+                        <a:rPr lang="en-US" b="1" dirty="0" smtClean="0">
+                          <a:solidFill>
+                            <a:schemeClr val="tx1"/>
+                          </a:solidFill>
+                        </a:rPr>
+                        <a:t>Full CubeSat System shall be able to execute all commands associated with its operation over RF</a:t>
+                      </a:r>
+                      <a:endParaRPr lang="en-US" b="1" dirty="0">
+                        <a:solidFill>
+                          <a:schemeClr val="tx1"/>
+                        </a:solidFill>
+                      </a:endParaRPr>
+                    </a:p>
+                  </a:txBody>
+                  <a:tcPr>
+                    <a:lnL w="12700" cap="flat" cmpd="sng" algn="ctr">
+                      <a:solidFill>
+                        <a:schemeClr val="tx1"/>
+                      </a:solidFill>
+                      <a:prstDash val="solid"/>
+                      <a:round/>
+                      <a:headEnd type="none" w="med" len="med"/>
+                      <a:tailEnd type="none" w="med" len="med"/>
+                    </a:lnL>
+                    <a:lnR w="12700" cap="flat" cmpd="sng" algn="ctr">
+                      <a:solidFill>
+                        <a:schemeClr val="tx1"/>
+                      </a:solidFill>
+                      <a:prstDash val="solid"/>
+                      <a:round/>
+                      <a:headEnd type="none" w="med" len="med"/>
+                      <a:tailEnd type="none" w="med" len="med"/>
+                    </a:lnR>
+                    <a:lnT w="12700" cap="flat" cmpd="sng" algn="ctr">
+                      <a:solidFill>
+                        <a:schemeClr val="tx1"/>
+                      </a:solidFill>
+                      <a:prstDash val="solid"/>
+                      <a:round/>
+                      <a:headEnd type="none" w="med" len="med"/>
+                      <a:tailEnd type="none" w="med" len="med"/>
+                    </a:lnT>
+                    <a:lnB w="12700" cap="flat" cmpd="sng" algn="ctr">
+                      <a:solidFill>
+                        <a:schemeClr val="tx1"/>
+                      </a:solidFill>
+                      <a:prstDash val="solid"/>
+                      <a:round/>
+                      <a:headEnd type="none" w="med" len="med"/>
+                      <a:tailEnd type="none" w="med" len="med"/>
+                    </a:lnB>
+                    <a:solidFill>
+                      <a:schemeClr val="tx2">
+                        <a:lumMod val="40000"/>
+                        <a:lumOff val="60000"/>
+                      </a:schemeClr>
+                    </a:solidFill>
+                  </a:tcPr>
+                </a:tc>
+              </a:tr>
+              <a:tr h="370840">
+                <a:tc>
+                  <a:txBody>
+                    <a:bodyPr/>
+                    <a:lstStyle/>
+                    <a:p>
+                      <a:r>
+                        <a:rPr lang="en-US" b="0" dirty="0" smtClean="0">
+                          <a:solidFill>
+                            <a:schemeClr val="bg1"/>
+                          </a:solidFill>
+                        </a:rPr>
+                        <a:t>Validation Method</a:t>
+                      </a:r>
+                      <a:endParaRPr lang="en-US" b="0" dirty="0">
+                        <a:solidFill>
+                          <a:schemeClr val="bg1"/>
+                        </a:solidFill>
+                      </a:endParaRPr>
+                    </a:p>
+                  </a:txBody>
+                  <a:tcPr anchor="ctr">
+                    <a:lnL w="12700" cap="flat" cmpd="sng" algn="ctr">
+                      <a:solidFill>
+                        <a:schemeClr val="tx1"/>
+                      </a:solidFill>
+                      <a:prstDash val="solid"/>
+                      <a:round/>
+                      <a:headEnd type="none" w="med" len="med"/>
+                      <a:tailEnd type="none" w="med" len="med"/>
+                    </a:lnL>
+                    <a:lnR w="12700" cap="flat" cmpd="sng" algn="ctr">
+                      <a:solidFill>
+                        <a:schemeClr val="tx1"/>
+                      </a:solidFill>
+                      <a:prstDash val="solid"/>
+                      <a:round/>
+                      <a:headEnd type="none" w="med" len="med"/>
+                      <a:tailEnd type="none" w="med" len="med"/>
+                    </a:lnR>
+                    <a:lnT w="12700" cap="flat" cmpd="sng" algn="ctr">
+                      <a:solidFill>
+                        <a:schemeClr val="tx1"/>
+                      </a:solidFill>
+                      <a:prstDash val="solid"/>
+                      <a:round/>
+                      <a:headEnd type="none" w="med" len="med"/>
+                      <a:tailEnd type="none" w="med" len="med"/>
+                    </a:lnT>
+                    <a:lnB w="12700" cap="flat" cmpd="sng" algn="ctr">
+                      <a:solidFill>
+                        <a:schemeClr val="tx1"/>
+                      </a:solidFill>
+                      <a:prstDash val="solid"/>
+                      <a:round/>
+                      <a:headEnd type="none" w="med" len="med"/>
+                      <a:tailEnd type="none" w="med" len="med"/>
+                    </a:lnB>
+                    <a:solidFill>
+                      <a:schemeClr val="tx2">
+                        <a:lumMod val="75000"/>
+                      </a:schemeClr>
+                    </a:solidFill>
+                  </a:tcPr>
+                </a:tc>
+                <a:tc>
+                  <a:txBody>
+                    <a:bodyPr/>
+                    <a:lstStyle/>
+                    <a:p>
+                      <a:r>
+                        <a:rPr lang="en-US" b="1" i="1" dirty="0" smtClean="0">
+                          <a:solidFill>
+                            <a:schemeClr val="tx1"/>
+                          </a:solidFill>
+                        </a:rPr>
+                        <a:t>Test</a:t>
+                      </a:r>
+                      <a:endParaRPr lang="en-US" b="1" i="1" dirty="0">
+                        <a:solidFill>
+                          <a:schemeClr val="tx1"/>
+                        </a:solidFill>
+                      </a:endParaRPr>
+                    </a:p>
+                  </a:txBody>
+                  <a:tcPr>
+                    <a:lnL w="12700" cap="flat" cmpd="sng" algn="ctr">
+                      <a:solidFill>
+                        <a:schemeClr val="tx1"/>
+                      </a:solidFill>
+                      <a:prstDash val="solid"/>
+                      <a:round/>
+                      <a:headEnd type="none" w="med" len="med"/>
+                      <a:tailEnd type="none" w="med" len="med"/>
+                    </a:lnL>
+                    <a:lnR w="12700" cap="flat" cmpd="sng" algn="ctr">
+                      <a:solidFill>
+                        <a:schemeClr val="tx1"/>
+                      </a:solidFill>
+                      <a:prstDash val="solid"/>
+                      <a:round/>
+                      <a:headEnd type="none" w="med" len="med"/>
+                      <a:tailEnd type="none" w="med" len="med"/>
+                    </a:lnR>
+                    <a:lnT w="12700" cap="flat" cmpd="sng" algn="ctr">
+                      <a:solidFill>
+                        <a:schemeClr val="tx1"/>
+                      </a:solidFill>
+                      <a:prstDash val="solid"/>
+                      <a:round/>
+                      <a:headEnd type="none" w="med" len="med"/>
+                      <a:tailEnd type="none" w="med" len="med"/>
+                    </a:lnT>
+                    <a:lnB w="12700" cap="flat" cmpd="sng" algn="ctr">
+                      <a:solidFill>
+                        <a:schemeClr val="tx1"/>
+                      </a:solidFill>
+                      <a:prstDash val="solid"/>
+                      <a:round/>
+                      <a:headEnd type="none" w="med" len="med"/>
+                      <a:tailEnd type="none" w="med" len="med"/>
+                    </a:lnB>
+                    <a:solidFill>
+                      <a:schemeClr val="tx2">
+                        <a:lumMod val="40000"/>
+                        <a:lumOff val="60000"/>
+                      </a:schemeClr>
+                    </a:solidFill>
+                  </a:tcPr>
+                </a:tc>
+              </a:tr>
+            </a:tbl>
+          </a:graphicData>
+        </a:graphic>
+      </p:graphicFrame>
+      <p:sp>
+        <p:nvSpPr>
+          <p:cNvPr id="5" name="TextBox 4"/>
+          <p:cNvSpPr txBox="1"/>
+          <p:nvPr/>
+        </p:nvSpPr>
+        <p:spPr>
+          <a:xfrm>
+            <a:off x="381000" y="3676471"/>
+            <a:ext cx="8305800" cy="830997"/>
+          </a:xfrm>
+          <a:prstGeom prst="rect">
+            <a:avLst/>
+          </a:prstGeom>
+          <a:noFill/>
+        </p:spPr>
+        <p:txBody>
+          <a:bodyPr wrap="square" rtlCol="0">
+            <a:spAutoFit/>
+          </a:bodyPr>
+          <a:lstStyle/>
+          <a:p>
+            <a:r>
+              <a:rPr lang="en-US" sz="2400" dirty="0"/>
+              <a:t>The requirement needs to be met so the CubeSat system can perform functional tests.</a:t>
+            </a:r>
+            <a:endParaRPr lang="en-US" sz="2400" dirty="0"/>
+          </a:p>
+        </p:txBody>
+      </p:sp>
+    </p:spTree>
+    <p:extLst>
+      <p:ext uri="{BB962C8B-B14F-4D97-AF65-F5344CB8AC3E}">
+        <p14:creationId xmlns:p14="http://schemas.microsoft.com/office/powerpoint/2010/main" val="257547029"/>
+      </p:ext>
+    </p:extLst>
+  </p:cSld>
+  <p:clrMapOvr>
+    <a:masterClrMapping/>
+  </p:clrMapOvr>
+  <p:timing>
+    <p:tnLst>
+      <p:par>
+        <p:cTn id="1" dur="indefinite" restart="never" nodeType="tmRoot"/>
+      </p:par>
+    </p:tnLst>
+  </p:timing>
+</p:sld>
+</file>
+
+<file path=ppt/slides/slide7.xml><?xml version="1.0" encoding="utf-8"?>
+<p:sld xmlns:a="http://schemas.openxmlformats.org/drawingml/2006/main" xmlns:r="http://schemas.openxmlformats.org/officeDocument/2006/relationships" xmlns:p="http://schemas.openxmlformats.org/presentationml/2006/main">
+  <p:cSld>
+    <p:spTree>
+      <p:nvGrpSpPr>
+        <p:cNvPr id="1" name=""/>
+        <p:cNvGrpSpPr/>
+        <p:nvPr/>
+      </p:nvGrpSpPr>
+      <p:grpSpPr>
+        <a:xfrm>
+          <a:off x="0" y="0"/>
+          <a:ext cx="0" cy="0"/>
+          <a:chOff x="0" y="0"/>
+          <a:chExt cx="0" cy="0"/>
+        </a:xfrm>
+      </p:grpSpPr>
+      <p:sp>
+        <p:nvSpPr>
+          <p:cNvPr id="2" name="Title 1"/>
+          <p:cNvSpPr>
+            <a:spLocks noGrp="1"/>
+          </p:cNvSpPr>
+          <p:nvPr>
+            <p:ph type="title"/>
+          </p:nvPr>
+        </p:nvSpPr>
+        <p:spPr/>
+        <p:txBody>
+          <a:bodyPr>
+            <a:normAutofit/>
+          </a:bodyPr>
+          <a:lstStyle/>
+          <a:p>
+            <a:r>
+              <a:rPr lang="en-US" i="1" dirty="0" smtClean="0"/>
+              <a:t>RCL.PL.TST4</a:t>
+            </a:r>
+            <a:endParaRPr lang="en-US" i="1" dirty="0"/>
+          </a:p>
+        </p:txBody>
+      </p:sp>
+      <p:graphicFrame>
+        <p:nvGraphicFramePr>
+          <p:cNvPr id="4" name="Content Placeholder 3"/>
+          <p:cNvGraphicFramePr>
+            <a:graphicFrameLocks noGrp="1"/>
+          </p:cNvGraphicFramePr>
+          <p:nvPr>
+            <p:ph idx="1"/>
+            <p:extLst>
+              <p:ext uri="{D42A27DB-BD31-4B8C-83A1-F6EECF244321}">
+                <p14:modId xmlns:p14="http://schemas.microsoft.com/office/powerpoint/2010/main" val="2845696522"/>
+              </p:ext>
+            </p:extLst>
+          </p:nvPr>
+        </p:nvGraphicFramePr>
+        <p:xfrm>
+          <a:off x="457200" y="1371600"/>
+          <a:ext cx="8229600" cy="1656080"/>
+        </p:xfrm>
+        <a:graphic>
+          <a:graphicData uri="http://schemas.openxmlformats.org/drawingml/2006/table">
+            <a:tbl>
+              <a:tblPr firstRow="1" bandRow="1">
+                <a:tableStyleId>{5C22544A-7EE6-4342-B048-85BDC9FD1C3A}</a:tableStyleId>
+              </a:tblPr>
+              <a:tblGrid>
+                <a:gridCol w="3200400"/>
+                <a:gridCol w="5029200"/>
+              </a:tblGrid>
+              <a:tr h="370840">
+                <a:tc>
+                  <a:txBody>
+                    <a:bodyPr/>
+                    <a:lstStyle/>
+                    <a:p>
+                      <a:r>
+                        <a:rPr lang="en-US" b="0" dirty="0" smtClean="0">
+                          <a:solidFill>
+                            <a:schemeClr val="bg1"/>
+                          </a:solidFill>
+                        </a:rPr>
+                        <a:t> RVM Requirement Number</a:t>
+                      </a:r>
+                      <a:endParaRPr lang="en-US" b="0" dirty="0">
+                        <a:solidFill>
+                          <a:schemeClr val="bg1"/>
+                        </a:solidFill>
+                      </a:endParaRPr>
+                    </a:p>
+                  </a:txBody>
+                  <a:tcPr anchor="ctr">
+                    <a:lnL w="12700" cap="flat" cmpd="sng" algn="ctr">
+                      <a:solidFill>
+                        <a:schemeClr val="tx1"/>
+                      </a:solidFill>
+                      <a:prstDash val="solid"/>
+                      <a:round/>
+                      <a:headEnd type="none" w="med" len="med"/>
+                      <a:tailEnd type="none" w="med" len="med"/>
+                    </a:lnL>
+                    <a:lnR w="12700" cap="flat" cmpd="sng" algn="ctr">
+                      <a:solidFill>
+                        <a:schemeClr val="tx1"/>
+                      </a:solidFill>
+                      <a:prstDash val="solid"/>
+                      <a:round/>
+                      <a:headEnd type="none" w="med" len="med"/>
+                      <a:tailEnd type="none" w="med" len="med"/>
+                    </a:lnR>
+                    <a:lnT w="12700" cap="flat" cmpd="sng" algn="ctr">
+                      <a:solidFill>
+                        <a:schemeClr val="tx1"/>
+                      </a:solidFill>
+                      <a:prstDash val="solid"/>
+                      <a:round/>
+                      <a:headEnd type="none" w="med" len="med"/>
+                      <a:tailEnd type="none" w="med" len="med"/>
+                    </a:lnT>
+                    <a:lnB w="12700" cap="flat" cmpd="sng" algn="ctr">
+                      <a:solidFill>
+                        <a:schemeClr val="tx1"/>
+                      </a:solidFill>
+                      <a:prstDash val="solid"/>
+                      <a:round/>
+                      <a:headEnd type="none" w="med" len="med"/>
+                      <a:tailEnd type="none" w="med" len="med"/>
+                    </a:lnB>
+                    <a:solidFill>
+                      <a:schemeClr val="tx2">
+                        <a:lumMod val="75000"/>
+                      </a:schemeClr>
+                    </a:solidFill>
+                  </a:tcPr>
+                </a:tc>
+                <a:tc>
+                  <a:txBody>
+                    <a:bodyPr/>
+                    <a:lstStyle/>
+                    <a:p>
+                      <a:r>
+                        <a:rPr lang="en-US" b="1" dirty="0" smtClean="0">
+                          <a:solidFill>
+                            <a:schemeClr val="tx1"/>
+                          </a:solidFill>
+                        </a:rPr>
+                        <a:t>TST4</a:t>
+                      </a:r>
+                      <a:endParaRPr lang="en-US" b="1" dirty="0">
+                        <a:solidFill>
+                          <a:schemeClr val="tx1"/>
+                        </a:solidFill>
+                      </a:endParaRPr>
+                    </a:p>
+                  </a:txBody>
+                  <a:tcPr>
+                    <a:lnL w="12700" cap="flat" cmpd="sng" algn="ctr">
+                      <a:solidFill>
+                        <a:schemeClr val="tx1"/>
+                      </a:solidFill>
+                      <a:prstDash val="solid"/>
+                      <a:round/>
+                      <a:headEnd type="none" w="med" len="med"/>
+                      <a:tailEnd type="none" w="med" len="med"/>
+                    </a:lnL>
+                    <a:lnR w="12700" cap="flat" cmpd="sng" algn="ctr">
+                      <a:solidFill>
+                        <a:schemeClr val="tx1"/>
+                      </a:solidFill>
+                      <a:prstDash val="solid"/>
+                      <a:round/>
+                      <a:headEnd type="none" w="med" len="med"/>
+                      <a:tailEnd type="none" w="med" len="med"/>
+                    </a:lnR>
+                    <a:lnT w="12700" cap="flat" cmpd="sng" algn="ctr">
+                      <a:solidFill>
+                        <a:schemeClr val="tx1"/>
+                      </a:solidFill>
+                      <a:prstDash val="solid"/>
+                      <a:round/>
+                      <a:headEnd type="none" w="med" len="med"/>
+                      <a:tailEnd type="none" w="med" len="med"/>
+                    </a:lnT>
+                    <a:lnB w="12700" cap="flat" cmpd="sng" algn="ctr">
+                      <a:solidFill>
+                        <a:schemeClr val="tx1"/>
+                      </a:solidFill>
+                      <a:prstDash val="solid"/>
+                      <a:round/>
+                      <a:headEnd type="none" w="med" len="med"/>
+                      <a:tailEnd type="none" w="med" len="med"/>
+                    </a:lnB>
+                    <a:solidFill>
+                      <a:schemeClr val="tx2">
+                        <a:lumMod val="40000"/>
+                        <a:lumOff val="60000"/>
+                      </a:schemeClr>
+                    </a:solidFill>
+                  </a:tcPr>
+                </a:tc>
+              </a:tr>
+              <a:tr h="370840">
+                <a:tc>
+                  <a:txBody>
+                    <a:bodyPr/>
+                    <a:lstStyle/>
+                    <a:p>
+                      <a:r>
+                        <a:rPr lang="en-US" b="0" dirty="0" smtClean="0">
+                          <a:solidFill>
+                            <a:schemeClr val="bg1"/>
+                          </a:solidFill>
+                        </a:rPr>
+                        <a:t>RVM </a:t>
+                      </a:r>
+                      <a:r>
+                        <a:rPr lang="en-US" b="0" baseline="0" dirty="0" smtClean="0">
+                          <a:solidFill>
+                            <a:schemeClr val="bg1"/>
+                          </a:solidFill>
+                        </a:rPr>
+                        <a:t>Requirement Wording</a:t>
+                      </a:r>
+                      <a:endParaRPr lang="en-US" b="0" dirty="0">
+                        <a:solidFill>
+                          <a:schemeClr val="bg1"/>
+                        </a:solidFill>
+                      </a:endParaRPr>
+                    </a:p>
+                  </a:txBody>
+                  <a:tcPr anchor="ctr">
+                    <a:lnL w="12700" cap="flat" cmpd="sng" algn="ctr">
+                      <a:solidFill>
+                        <a:schemeClr val="tx1"/>
+                      </a:solidFill>
+                      <a:prstDash val="solid"/>
+                      <a:round/>
+                      <a:headEnd type="none" w="med" len="med"/>
+                      <a:tailEnd type="none" w="med" len="med"/>
+                    </a:lnL>
+                    <a:lnR w="12700" cap="flat" cmpd="sng" algn="ctr">
+                      <a:solidFill>
+                        <a:schemeClr val="tx1"/>
+                      </a:solidFill>
+                      <a:prstDash val="solid"/>
+                      <a:round/>
+                      <a:headEnd type="none" w="med" len="med"/>
+                      <a:tailEnd type="none" w="med" len="med"/>
+                    </a:lnR>
+                    <a:lnT w="12700" cap="flat" cmpd="sng" algn="ctr">
+                      <a:solidFill>
+                        <a:schemeClr val="tx1"/>
+                      </a:solidFill>
+                      <a:prstDash val="solid"/>
+                      <a:round/>
+                      <a:headEnd type="none" w="med" len="med"/>
+                      <a:tailEnd type="none" w="med" len="med"/>
+                    </a:lnT>
+                    <a:lnB w="12700" cap="flat" cmpd="sng" algn="ctr">
+                      <a:solidFill>
+                        <a:schemeClr val="tx1"/>
+                      </a:solidFill>
+                      <a:prstDash val="solid"/>
+                      <a:round/>
+                      <a:headEnd type="none" w="med" len="med"/>
+                      <a:tailEnd type="none" w="med" len="med"/>
+                    </a:lnB>
+                    <a:solidFill>
+                      <a:schemeClr val="tx2">
+                        <a:lumMod val="75000"/>
+                      </a:schemeClr>
+                    </a:solidFill>
+                  </a:tcPr>
+                </a:tc>
+                <a:tc>
+                  <a:txBody>
+                    <a:bodyPr/>
+                    <a:lstStyle/>
+                    <a:p>
+                      <a:r>
+                        <a:rPr lang="en-US" b="1" dirty="0" smtClean="0">
+                          <a:solidFill>
+                            <a:schemeClr val="tx1"/>
+                          </a:solidFill>
+                        </a:rPr>
+                        <a:t>Full CubeSat System shall be able to close a link with the SSRL Ground Station from a distance of at least 200 meters</a:t>
+                      </a:r>
+                      <a:endParaRPr lang="en-US" b="1" dirty="0">
+                        <a:solidFill>
+                          <a:schemeClr val="tx1"/>
+                        </a:solidFill>
+                      </a:endParaRPr>
+                    </a:p>
+                  </a:txBody>
+                  <a:tcPr>
+                    <a:lnL w="12700" cap="flat" cmpd="sng" algn="ctr">
+                      <a:solidFill>
+                        <a:schemeClr val="tx1"/>
+                      </a:solidFill>
+                      <a:prstDash val="solid"/>
+                      <a:round/>
+                      <a:headEnd type="none" w="med" len="med"/>
+                      <a:tailEnd type="none" w="med" len="med"/>
+                    </a:lnL>
+                    <a:lnR w="12700" cap="flat" cmpd="sng" algn="ctr">
+                      <a:solidFill>
+                        <a:schemeClr val="tx1"/>
+                      </a:solidFill>
+                      <a:prstDash val="solid"/>
+                      <a:round/>
+                      <a:headEnd type="none" w="med" len="med"/>
+                      <a:tailEnd type="none" w="med" len="med"/>
+                    </a:lnR>
+                    <a:lnT w="12700" cap="flat" cmpd="sng" algn="ctr">
+                      <a:solidFill>
+                        <a:schemeClr val="tx1"/>
+                      </a:solidFill>
+                      <a:prstDash val="solid"/>
+                      <a:round/>
+                      <a:headEnd type="none" w="med" len="med"/>
+                      <a:tailEnd type="none" w="med" len="med"/>
+                    </a:lnT>
+                    <a:lnB w="12700" cap="flat" cmpd="sng" algn="ctr">
+                      <a:solidFill>
+                        <a:schemeClr val="tx1"/>
+                      </a:solidFill>
+                      <a:prstDash val="solid"/>
+                      <a:round/>
+                      <a:headEnd type="none" w="med" len="med"/>
+                      <a:tailEnd type="none" w="med" len="med"/>
+                    </a:lnB>
+                    <a:solidFill>
+                      <a:schemeClr val="tx2">
+                        <a:lumMod val="40000"/>
+                        <a:lumOff val="60000"/>
+                      </a:schemeClr>
+                    </a:solidFill>
+                  </a:tcPr>
+                </a:tc>
+              </a:tr>
+              <a:tr h="370840">
+                <a:tc>
+                  <a:txBody>
+                    <a:bodyPr/>
+                    <a:lstStyle/>
+                    <a:p>
+                      <a:r>
+                        <a:rPr lang="en-US" b="0" dirty="0" smtClean="0">
+                          <a:solidFill>
+                            <a:schemeClr val="bg1"/>
+                          </a:solidFill>
+                        </a:rPr>
+                        <a:t>Validation Method</a:t>
+                      </a:r>
+                      <a:endParaRPr lang="en-US" b="0" dirty="0">
+                        <a:solidFill>
+                          <a:schemeClr val="bg1"/>
+                        </a:solidFill>
+                      </a:endParaRPr>
+                    </a:p>
+                  </a:txBody>
+                  <a:tcPr anchor="ctr">
+                    <a:lnL w="12700" cap="flat" cmpd="sng" algn="ctr">
+                      <a:solidFill>
+                        <a:schemeClr val="tx1"/>
+                      </a:solidFill>
+                      <a:prstDash val="solid"/>
+                      <a:round/>
+                      <a:headEnd type="none" w="med" len="med"/>
+                      <a:tailEnd type="none" w="med" len="med"/>
+                    </a:lnL>
+                    <a:lnR w="12700" cap="flat" cmpd="sng" algn="ctr">
+                      <a:solidFill>
+                        <a:schemeClr val="tx1"/>
+                      </a:solidFill>
+                      <a:prstDash val="solid"/>
+                      <a:round/>
+                      <a:headEnd type="none" w="med" len="med"/>
+                      <a:tailEnd type="none" w="med" len="med"/>
+                    </a:lnR>
+                    <a:lnT w="12700" cap="flat" cmpd="sng" algn="ctr">
+                      <a:solidFill>
+                        <a:schemeClr val="tx1"/>
+                      </a:solidFill>
+                      <a:prstDash val="solid"/>
+                      <a:round/>
+                      <a:headEnd type="none" w="med" len="med"/>
+                      <a:tailEnd type="none" w="med" len="med"/>
+                    </a:lnT>
+                    <a:lnB w="12700" cap="flat" cmpd="sng" algn="ctr">
+                      <a:solidFill>
+                        <a:schemeClr val="tx1"/>
+                      </a:solidFill>
+                      <a:prstDash val="solid"/>
+                      <a:round/>
+                      <a:headEnd type="none" w="med" len="med"/>
+                      <a:tailEnd type="none" w="med" len="med"/>
+                    </a:lnB>
+                    <a:solidFill>
+                      <a:schemeClr val="tx2">
+                        <a:lumMod val="75000"/>
+                      </a:schemeClr>
+                    </a:solidFill>
+                  </a:tcPr>
+                </a:tc>
+                <a:tc>
+                  <a:txBody>
+                    <a:bodyPr/>
+                    <a:lstStyle/>
+                    <a:p>
+                      <a:r>
+                        <a:rPr lang="en-US" b="1" i="1" dirty="0" smtClean="0">
+                          <a:solidFill>
+                            <a:schemeClr val="tx1"/>
+                          </a:solidFill>
+                        </a:rPr>
+                        <a:t>Test</a:t>
+                      </a:r>
+                      <a:endParaRPr lang="en-US" b="1" i="1" dirty="0">
+                        <a:solidFill>
+                          <a:schemeClr val="tx1"/>
+                        </a:solidFill>
+                      </a:endParaRPr>
+                    </a:p>
+                  </a:txBody>
+                  <a:tcPr>
+                    <a:lnL w="12700" cap="flat" cmpd="sng" algn="ctr">
+                      <a:solidFill>
+                        <a:schemeClr val="tx1"/>
+                      </a:solidFill>
+                      <a:prstDash val="solid"/>
+                      <a:round/>
+                      <a:headEnd type="none" w="med" len="med"/>
+                      <a:tailEnd type="none" w="med" len="med"/>
+                    </a:lnL>
+                    <a:lnR w="12700" cap="flat" cmpd="sng" algn="ctr">
+                      <a:solidFill>
+                        <a:schemeClr val="tx1"/>
+                      </a:solidFill>
+                      <a:prstDash val="solid"/>
+                      <a:round/>
+                      <a:headEnd type="none" w="med" len="med"/>
+                      <a:tailEnd type="none" w="med" len="med"/>
+                    </a:lnR>
+                    <a:lnT w="12700" cap="flat" cmpd="sng" algn="ctr">
+                      <a:solidFill>
+                        <a:schemeClr val="tx1"/>
+                      </a:solidFill>
+                      <a:prstDash val="solid"/>
+                      <a:round/>
+                      <a:headEnd type="none" w="med" len="med"/>
+                      <a:tailEnd type="none" w="med" len="med"/>
+                    </a:lnT>
+                    <a:lnB w="12700" cap="flat" cmpd="sng" algn="ctr">
+                      <a:solidFill>
+                        <a:schemeClr val="tx1"/>
+                      </a:solidFill>
+                      <a:prstDash val="solid"/>
+                      <a:round/>
+                      <a:headEnd type="none" w="med" len="med"/>
+                      <a:tailEnd type="none" w="med" len="med"/>
+                    </a:lnB>
+                    <a:solidFill>
+                      <a:schemeClr val="tx2">
+                        <a:lumMod val="40000"/>
+                        <a:lumOff val="60000"/>
+                      </a:schemeClr>
+                    </a:solidFill>
+                  </a:tcPr>
+                </a:tc>
+              </a:tr>
+            </a:tbl>
+          </a:graphicData>
+        </a:graphic>
+      </p:graphicFrame>
+      <p:sp>
+        <p:nvSpPr>
+          <p:cNvPr id="5" name="TextBox 4"/>
+          <p:cNvSpPr txBox="1"/>
+          <p:nvPr/>
+        </p:nvSpPr>
+        <p:spPr>
+          <a:xfrm>
+            <a:off x="381000" y="3676471"/>
+            <a:ext cx="8305800" cy="1569660"/>
+          </a:xfrm>
+          <a:prstGeom prst="rect">
+            <a:avLst/>
+          </a:prstGeom>
+          <a:noFill/>
+        </p:spPr>
+        <p:txBody>
+          <a:bodyPr wrap="square" rtlCol="0">
+            <a:spAutoFit/>
+          </a:bodyPr>
+          <a:lstStyle/>
+          <a:p>
+            <a:r>
+              <a:rPr lang="en-US" sz="2400" dirty="0"/>
+              <a:t>It has been required by the Air Force Research Laboratory before testing can take place there, thus leading to its requirement for the Rascal mission. </a:t>
+            </a:r>
+            <a:r>
+              <a:rPr lang="en-US" sz="2400" dirty="0" smtClean="0"/>
+              <a:t>It also improves </a:t>
+            </a:r>
+            <a:r>
+              <a:rPr lang="en-US" sz="2400" dirty="0"/>
+              <a:t>confidence in the reliability of the Rascal communication system prior to launch.</a:t>
+            </a:r>
+            <a:endParaRPr lang="en-US" sz="2400" dirty="0"/>
+          </a:p>
+        </p:txBody>
+      </p:sp>
+    </p:spTree>
+    <p:extLst>
+      <p:ext uri="{BB962C8B-B14F-4D97-AF65-F5344CB8AC3E}">
+        <p14:creationId xmlns:p14="http://schemas.microsoft.com/office/powerpoint/2010/main" val="2948721205"/>
+      </p:ext>
+    </p:extLst>
+  </p:cSld>
+  <p:clrMapOvr>
+    <a:masterClrMapping/>
+  </p:clrMapOvr>
+  <p:timing>
+    <p:tnLst>
+      <p:par>
+        <p:cTn id="1" dur="indefinite" restart="never" nodeType="tmRoot"/>
+      </p:par>
+    </p:tnLst>
+  </p:timing>
+</p:sld>
+</file>
+
+<file path=ppt/slides/slide8.xml><?xml version="1.0" encoding="utf-8"?>
+<p:sld xmlns:a="http://schemas.openxmlformats.org/drawingml/2006/main" xmlns:r="http://schemas.openxmlformats.org/officeDocument/2006/relationships" xmlns:p="http://schemas.openxmlformats.org/presentationml/2006/main">
+  <p:cSld>
+    <p:spTree>
+      <p:nvGrpSpPr>
+        <p:cNvPr id="1" name=""/>
+        <p:cNvGrpSpPr/>
+        <p:nvPr/>
+      </p:nvGrpSpPr>
+      <p:grpSpPr>
+        <a:xfrm>
+          <a:off x="0" y="0"/>
+          <a:ext cx="0" cy="0"/>
+          <a:chOff x="0" y="0"/>
+          <a:chExt cx="0" cy="0"/>
+        </a:xfrm>
+      </p:grpSpPr>
+      <p:sp>
+        <p:nvSpPr>
+          <p:cNvPr id="2" name="Title 1"/>
+          <p:cNvSpPr>
+            <a:spLocks noGrp="1"/>
+          </p:cNvSpPr>
+          <p:nvPr>
+            <p:ph type="title"/>
+          </p:nvPr>
+        </p:nvSpPr>
+        <p:spPr/>
+        <p:txBody>
+          <a:bodyPr>
+            <a:normAutofit/>
+          </a:bodyPr>
+          <a:lstStyle/>
+          <a:p>
+            <a:r>
+              <a:rPr lang="en-US" i="1" dirty="0" smtClean="0"/>
+              <a:t>RCL.PL.TST5</a:t>
+            </a:r>
+            <a:endParaRPr lang="en-US" i="1" dirty="0"/>
+          </a:p>
+        </p:txBody>
+      </p:sp>
+      <p:graphicFrame>
+        <p:nvGraphicFramePr>
+          <p:cNvPr id="4" name="Content Placeholder 3"/>
+          <p:cNvGraphicFramePr>
+            <a:graphicFrameLocks noGrp="1"/>
+          </p:cNvGraphicFramePr>
+          <p:nvPr>
+            <p:ph idx="1"/>
+            <p:extLst>
+              <p:ext uri="{D42A27DB-BD31-4B8C-83A1-F6EECF244321}">
+                <p14:modId xmlns:p14="http://schemas.microsoft.com/office/powerpoint/2010/main" val="1552878453"/>
+              </p:ext>
+            </p:extLst>
+          </p:nvPr>
+        </p:nvGraphicFramePr>
+        <p:xfrm>
+          <a:off x="457200" y="1371600"/>
+          <a:ext cx="8229600" cy="1656080"/>
+        </p:xfrm>
+        <a:graphic>
+          <a:graphicData uri="http://schemas.openxmlformats.org/drawingml/2006/table">
+            <a:tbl>
+              <a:tblPr firstRow="1" bandRow="1">
+                <a:tableStyleId>{5C22544A-7EE6-4342-B048-85BDC9FD1C3A}</a:tableStyleId>
+              </a:tblPr>
+              <a:tblGrid>
+                <a:gridCol w="3200400"/>
+                <a:gridCol w="5029200"/>
+              </a:tblGrid>
+              <a:tr h="370840">
+                <a:tc>
+                  <a:txBody>
+                    <a:bodyPr/>
+                    <a:lstStyle/>
+                    <a:p>
+                      <a:r>
+                        <a:rPr lang="en-US" b="0" dirty="0" smtClean="0">
+                          <a:solidFill>
+                            <a:schemeClr val="bg1"/>
+                          </a:solidFill>
+                        </a:rPr>
+                        <a:t> RVM Requirement Number</a:t>
+                      </a:r>
+                      <a:endParaRPr lang="en-US" b="0" dirty="0">
+                        <a:solidFill>
+                          <a:schemeClr val="bg1"/>
+                        </a:solidFill>
+                      </a:endParaRPr>
+                    </a:p>
+                  </a:txBody>
+                  <a:tcPr anchor="ctr">
+                    <a:lnL w="12700" cap="flat" cmpd="sng" algn="ctr">
+                      <a:solidFill>
+                        <a:schemeClr val="tx1"/>
+                      </a:solidFill>
+                      <a:prstDash val="solid"/>
+                      <a:round/>
+                      <a:headEnd type="none" w="med" len="med"/>
+                      <a:tailEnd type="none" w="med" len="med"/>
+                    </a:lnL>
+                    <a:lnR w="12700" cap="flat" cmpd="sng" algn="ctr">
+                      <a:solidFill>
+                        <a:schemeClr val="tx1"/>
+                      </a:solidFill>
+                      <a:prstDash val="solid"/>
+                      <a:round/>
+                      <a:headEnd type="none" w="med" len="med"/>
+                      <a:tailEnd type="none" w="med" len="med"/>
+                    </a:lnR>
+                    <a:lnT w="12700" cap="flat" cmpd="sng" algn="ctr">
+                      <a:solidFill>
+                        <a:schemeClr val="tx1"/>
+                      </a:solidFill>
+                      <a:prstDash val="solid"/>
+                      <a:round/>
+                      <a:headEnd type="none" w="med" len="med"/>
+                      <a:tailEnd type="none" w="med" len="med"/>
+                    </a:lnT>
+                    <a:lnB w="12700" cap="flat" cmpd="sng" algn="ctr">
+                      <a:solidFill>
+                        <a:schemeClr val="tx1"/>
+                      </a:solidFill>
+                      <a:prstDash val="solid"/>
+                      <a:round/>
+                      <a:headEnd type="none" w="med" len="med"/>
+                      <a:tailEnd type="none" w="med" len="med"/>
+                    </a:lnB>
+                    <a:solidFill>
+                      <a:schemeClr val="tx2">
+                        <a:lumMod val="75000"/>
+                      </a:schemeClr>
+                    </a:solidFill>
+                  </a:tcPr>
+                </a:tc>
+                <a:tc>
+                  <a:txBody>
+                    <a:bodyPr/>
+                    <a:lstStyle/>
+                    <a:p>
+                      <a:r>
+                        <a:rPr lang="en-US" b="1" dirty="0" smtClean="0">
+                          <a:solidFill>
+                            <a:schemeClr val="tx1"/>
+                          </a:solidFill>
+                        </a:rPr>
+                        <a:t>TST5</a:t>
+                      </a:r>
+                      <a:endParaRPr lang="en-US" b="1" dirty="0">
+                        <a:solidFill>
+                          <a:schemeClr val="tx1"/>
+                        </a:solidFill>
+                      </a:endParaRPr>
+                    </a:p>
+                  </a:txBody>
+                  <a:tcPr>
+                    <a:lnL w="12700" cap="flat" cmpd="sng" algn="ctr">
+                      <a:solidFill>
+                        <a:schemeClr val="tx1"/>
+                      </a:solidFill>
+                      <a:prstDash val="solid"/>
+                      <a:round/>
+                      <a:headEnd type="none" w="med" len="med"/>
+                      <a:tailEnd type="none" w="med" len="med"/>
+                    </a:lnL>
+                    <a:lnR w="12700" cap="flat" cmpd="sng" algn="ctr">
+                      <a:solidFill>
+                        <a:schemeClr val="tx1"/>
+                      </a:solidFill>
+                      <a:prstDash val="solid"/>
+                      <a:round/>
+                      <a:headEnd type="none" w="med" len="med"/>
+                      <a:tailEnd type="none" w="med" len="med"/>
+                    </a:lnR>
+                    <a:lnT w="12700" cap="flat" cmpd="sng" algn="ctr">
+                      <a:solidFill>
+                        <a:schemeClr val="tx1"/>
+                      </a:solidFill>
+                      <a:prstDash val="solid"/>
+                      <a:round/>
+                      <a:headEnd type="none" w="med" len="med"/>
+                      <a:tailEnd type="none" w="med" len="med"/>
+                    </a:lnT>
+                    <a:lnB w="12700" cap="flat" cmpd="sng" algn="ctr">
+                      <a:solidFill>
+                        <a:schemeClr val="tx1"/>
+                      </a:solidFill>
+                      <a:prstDash val="solid"/>
+                      <a:round/>
+                      <a:headEnd type="none" w="med" len="med"/>
+                      <a:tailEnd type="none" w="med" len="med"/>
+                    </a:lnB>
+                    <a:solidFill>
+                      <a:schemeClr val="tx2">
+                        <a:lumMod val="40000"/>
+                        <a:lumOff val="60000"/>
+                      </a:schemeClr>
+                    </a:solidFill>
+                  </a:tcPr>
+                </a:tc>
+              </a:tr>
+              <a:tr h="370840">
+                <a:tc>
+                  <a:txBody>
+                    <a:bodyPr/>
+                    <a:lstStyle/>
+                    <a:p>
+                      <a:r>
+                        <a:rPr lang="en-US" b="0" dirty="0" smtClean="0">
+                          <a:solidFill>
+                            <a:schemeClr val="bg1"/>
+                          </a:solidFill>
+                        </a:rPr>
+                        <a:t>RVM </a:t>
+                      </a:r>
+                      <a:r>
+                        <a:rPr lang="en-US" b="0" baseline="0" dirty="0" smtClean="0">
+                          <a:solidFill>
+                            <a:schemeClr val="bg1"/>
+                          </a:solidFill>
+                        </a:rPr>
+                        <a:t>Requirement Wording</a:t>
+                      </a:r>
+                      <a:endParaRPr lang="en-US" b="0" dirty="0">
+                        <a:solidFill>
+                          <a:schemeClr val="bg1"/>
+                        </a:solidFill>
+                      </a:endParaRPr>
+                    </a:p>
+                  </a:txBody>
+                  <a:tcPr anchor="ctr">
+                    <a:lnL w="12700" cap="flat" cmpd="sng" algn="ctr">
+                      <a:solidFill>
+                        <a:schemeClr val="tx1"/>
+                      </a:solidFill>
+                      <a:prstDash val="solid"/>
+                      <a:round/>
+                      <a:headEnd type="none" w="med" len="med"/>
+                      <a:tailEnd type="none" w="med" len="med"/>
+                    </a:lnL>
+                    <a:lnR w="12700" cap="flat" cmpd="sng" algn="ctr">
+                      <a:solidFill>
+                        <a:schemeClr val="tx1"/>
+                      </a:solidFill>
+                      <a:prstDash val="solid"/>
+                      <a:round/>
+                      <a:headEnd type="none" w="med" len="med"/>
+                      <a:tailEnd type="none" w="med" len="med"/>
+                    </a:lnR>
+                    <a:lnT w="12700" cap="flat" cmpd="sng" algn="ctr">
+                      <a:solidFill>
+                        <a:schemeClr val="tx1"/>
+                      </a:solidFill>
+                      <a:prstDash val="solid"/>
+                      <a:round/>
+                      <a:headEnd type="none" w="med" len="med"/>
+                      <a:tailEnd type="none" w="med" len="med"/>
+                    </a:lnT>
+                    <a:lnB w="12700" cap="flat" cmpd="sng" algn="ctr">
+                      <a:solidFill>
+                        <a:schemeClr val="tx1"/>
+                      </a:solidFill>
+                      <a:prstDash val="solid"/>
+                      <a:round/>
+                      <a:headEnd type="none" w="med" len="med"/>
+                      <a:tailEnd type="none" w="med" len="med"/>
+                    </a:lnB>
+                    <a:solidFill>
+                      <a:schemeClr val="tx2">
+                        <a:lumMod val="75000"/>
+                      </a:schemeClr>
+                    </a:solidFill>
+                  </a:tcPr>
+                </a:tc>
+                <a:tc>
+                  <a:txBody>
+                    <a:bodyPr/>
+                    <a:lstStyle/>
+                    <a:p>
+                      <a:r>
+                        <a:rPr lang="en-US" b="1" dirty="0" smtClean="0">
+                          <a:solidFill>
+                            <a:schemeClr val="tx1"/>
+                          </a:solidFill>
+                        </a:rPr>
+                        <a:t>Full CubeSat System shall be able to document the functionality of each subsystem through the running of a full-functional test</a:t>
+                      </a:r>
+                      <a:endParaRPr lang="en-US" b="1" dirty="0">
+                        <a:solidFill>
+                          <a:schemeClr val="tx1"/>
+                        </a:solidFill>
+                      </a:endParaRPr>
+                    </a:p>
+                  </a:txBody>
+                  <a:tcPr>
+                    <a:lnL w="12700" cap="flat" cmpd="sng" algn="ctr">
+                      <a:solidFill>
+                        <a:schemeClr val="tx1"/>
+                      </a:solidFill>
+                      <a:prstDash val="solid"/>
+                      <a:round/>
+                      <a:headEnd type="none" w="med" len="med"/>
+                      <a:tailEnd type="none" w="med" len="med"/>
+                    </a:lnL>
+                    <a:lnR w="12700" cap="flat" cmpd="sng" algn="ctr">
+                      <a:solidFill>
+                        <a:schemeClr val="tx1"/>
+                      </a:solidFill>
+                      <a:prstDash val="solid"/>
+                      <a:round/>
+                      <a:headEnd type="none" w="med" len="med"/>
+                      <a:tailEnd type="none" w="med" len="med"/>
+                    </a:lnR>
+                    <a:lnT w="12700" cap="flat" cmpd="sng" algn="ctr">
+                      <a:solidFill>
+                        <a:schemeClr val="tx1"/>
+                      </a:solidFill>
+                      <a:prstDash val="solid"/>
+                      <a:round/>
+                      <a:headEnd type="none" w="med" len="med"/>
+                      <a:tailEnd type="none" w="med" len="med"/>
+                    </a:lnT>
+                    <a:lnB w="12700" cap="flat" cmpd="sng" algn="ctr">
+                      <a:solidFill>
+                        <a:schemeClr val="tx1"/>
+                      </a:solidFill>
+                      <a:prstDash val="solid"/>
+                      <a:round/>
+                      <a:headEnd type="none" w="med" len="med"/>
+                      <a:tailEnd type="none" w="med" len="med"/>
+                    </a:lnB>
+                    <a:solidFill>
+                      <a:schemeClr val="tx2">
+                        <a:lumMod val="40000"/>
+                        <a:lumOff val="60000"/>
+                      </a:schemeClr>
+                    </a:solidFill>
+                  </a:tcPr>
+                </a:tc>
+              </a:tr>
+              <a:tr h="370840">
+                <a:tc>
+                  <a:txBody>
+                    <a:bodyPr/>
+                    <a:lstStyle/>
+                    <a:p>
+                      <a:r>
+                        <a:rPr lang="en-US" b="0" dirty="0" smtClean="0">
+                          <a:solidFill>
+                            <a:schemeClr val="bg1"/>
+                          </a:solidFill>
+                        </a:rPr>
+                        <a:t>Validation Method</a:t>
+                      </a:r>
+                      <a:endParaRPr lang="en-US" b="0" dirty="0">
+                        <a:solidFill>
+                          <a:schemeClr val="bg1"/>
+                        </a:solidFill>
+                      </a:endParaRPr>
+                    </a:p>
+                  </a:txBody>
+                  <a:tcPr anchor="ctr">
+                    <a:lnL w="12700" cap="flat" cmpd="sng" algn="ctr">
+                      <a:solidFill>
+                        <a:schemeClr val="tx1"/>
+                      </a:solidFill>
+                      <a:prstDash val="solid"/>
+                      <a:round/>
+                      <a:headEnd type="none" w="med" len="med"/>
+                      <a:tailEnd type="none" w="med" len="med"/>
+                    </a:lnL>
+                    <a:lnR w="12700" cap="flat" cmpd="sng" algn="ctr">
+                      <a:solidFill>
+                        <a:schemeClr val="tx1"/>
+                      </a:solidFill>
+                      <a:prstDash val="solid"/>
+                      <a:round/>
+                      <a:headEnd type="none" w="med" len="med"/>
+                      <a:tailEnd type="none" w="med" len="med"/>
+                    </a:lnR>
+                    <a:lnT w="12700" cap="flat" cmpd="sng" algn="ctr">
+                      <a:solidFill>
+                        <a:schemeClr val="tx1"/>
+                      </a:solidFill>
+                      <a:prstDash val="solid"/>
+                      <a:round/>
+                      <a:headEnd type="none" w="med" len="med"/>
+                      <a:tailEnd type="none" w="med" len="med"/>
+                    </a:lnT>
+                    <a:lnB w="12700" cap="flat" cmpd="sng" algn="ctr">
+                      <a:solidFill>
+                        <a:schemeClr val="tx1"/>
+                      </a:solidFill>
+                      <a:prstDash val="solid"/>
+                      <a:round/>
+                      <a:headEnd type="none" w="med" len="med"/>
+                      <a:tailEnd type="none" w="med" len="med"/>
+                    </a:lnB>
+                    <a:solidFill>
+                      <a:schemeClr val="tx2">
+                        <a:lumMod val="75000"/>
+                      </a:schemeClr>
+                    </a:solidFill>
+                  </a:tcPr>
+                </a:tc>
+                <a:tc>
+                  <a:txBody>
+                    <a:bodyPr/>
+                    <a:lstStyle/>
+                    <a:p>
+                      <a:r>
+                        <a:rPr lang="en-US" b="1" i="1" dirty="0" smtClean="0">
+                          <a:solidFill>
+                            <a:schemeClr val="tx1"/>
+                          </a:solidFill>
+                        </a:rPr>
+                        <a:t>Test</a:t>
+                      </a:r>
+                      <a:endParaRPr lang="en-US" b="1" i="1" dirty="0">
+                        <a:solidFill>
+                          <a:schemeClr val="tx1"/>
+                        </a:solidFill>
+                      </a:endParaRPr>
+                    </a:p>
+                  </a:txBody>
+                  <a:tcPr>
+                    <a:lnL w="12700" cap="flat" cmpd="sng" algn="ctr">
+                      <a:solidFill>
+                        <a:schemeClr val="tx1"/>
+                      </a:solidFill>
+                      <a:prstDash val="solid"/>
+                      <a:round/>
+                      <a:headEnd type="none" w="med" len="med"/>
+                      <a:tailEnd type="none" w="med" len="med"/>
+                    </a:lnL>
+                    <a:lnR w="12700" cap="flat" cmpd="sng" algn="ctr">
+                      <a:solidFill>
+                        <a:schemeClr val="tx1"/>
+                      </a:solidFill>
+                      <a:prstDash val="solid"/>
+                      <a:round/>
+                      <a:headEnd type="none" w="med" len="med"/>
+                      <a:tailEnd type="none" w="med" len="med"/>
+                    </a:lnR>
+                    <a:lnT w="12700" cap="flat" cmpd="sng" algn="ctr">
+                      <a:solidFill>
+                        <a:schemeClr val="tx1"/>
+                      </a:solidFill>
+                      <a:prstDash val="solid"/>
+                      <a:round/>
+                      <a:headEnd type="none" w="med" len="med"/>
+                      <a:tailEnd type="none" w="med" len="med"/>
+                    </a:lnT>
+                    <a:lnB w="12700" cap="flat" cmpd="sng" algn="ctr">
+                      <a:solidFill>
+                        <a:schemeClr val="tx1"/>
+                      </a:solidFill>
+                      <a:prstDash val="solid"/>
+                      <a:round/>
+                      <a:headEnd type="none" w="med" len="med"/>
+                      <a:tailEnd type="none" w="med" len="med"/>
+                    </a:lnB>
+                    <a:solidFill>
+                      <a:schemeClr val="tx2">
+                        <a:lumMod val="40000"/>
+                        <a:lumOff val="60000"/>
+                      </a:schemeClr>
+                    </a:solidFill>
+                  </a:tcPr>
+                </a:tc>
+              </a:tr>
+            </a:tbl>
+          </a:graphicData>
+        </a:graphic>
+      </p:graphicFrame>
+      <p:sp>
+        <p:nvSpPr>
+          <p:cNvPr id="5" name="TextBox 4"/>
+          <p:cNvSpPr txBox="1"/>
+          <p:nvPr/>
+        </p:nvSpPr>
+        <p:spPr>
+          <a:xfrm>
+            <a:off x="381000" y="3676471"/>
+            <a:ext cx="8305800" cy="1569660"/>
+          </a:xfrm>
+          <a:prstGeom prst="rect">
+            <a:avLst/>
+          </a:prstGeom>
+          <a:noFill/>
+        </p:spPr>
+        <p:txBody>
+          <a:bodyPr wrap="square" rtlCol="0">
+            <a:spAutoFit/>
+          </a:bodyPr>
+          <a:lstStyle/>
+          <a:p>
+            <a:r>
+              <a:rPr lang="en-US" sz="2400" dirty="0" smtClean="0"/>
+              <a:t>To meet </a:t>
+            </a:r>
+            <a:r>
+              <a:rPr lang="en-US" sz="2400" dirty="0"/>
+              <a:t>this requirement </a:t>
+            </a:r>
+            <a:r>
+              <a:rPr lang="en-US" sz="2400" dirty="0" smtClean="0"/>
+              <a:t>each </a:t>
+            </a:r>
+            <a:r>
+              <a:rPr lang="en-US" sz="2400" dirty="0"/>
+              <a:t>subsystem in the CubeSat system must successfully execute any on-orbit command that could potentially be sent to it, as well as demonstrate key on-orbit operations.</a:t>
+            </a:r>
+            <a:endParaRPr lang="en-US" sz="2400" dirty="0"/>
+          </a:p>
+        </p:txBody>
+      </p:sp>
+    </p:spTree>
+    <p:extLst>
+      <p:ext uri="{BB962C8B-B14F-4D97-AF65-F5344CB8AC3E}">
+        <p14:creationId xmlns:p14="http://schemas.microsoft.com/office/powerpoint/2010/main" val="1902469526"/>
       </p:ext>
     </p:extLst>
   </p:cSld>

</xml_diff>

<commit_message>
Added captions to pics
</commit_message>
<xml_diff>
--- a/CMQA/Presentations/Nate Slides/Nate Slides.pptx
+++ b/CMQA/Presentations/Nate Slides/Nate Slides.pptx
@@ -4704,8 +4704,8 @@
         </p:blipFill>
         <p:spPr bwMode="auto">
           <a:xfrm>
-            <a:off x="5566299" y="4876800"/>
-            <a:ext cx="2356485" cy="1782932"/>
+            <a:off x="3125628" y="4572000"/>
+            <a:ext cx="2816543" cy="1981200"/>
           </a:xfrm>
           <a:prstGeom prst="rect">
             <a:avLst/>
@@ -4718,6 +4718,49 @@
           </a:ln>
         </p:spPr>
       </p:pic>
+      <p:sp>
+        <p:nvSpPr>
+          <p:cNvPr id="3" name="TextBox 2"/>
+          <p:cNvSpPr txBox="1"/>
+          <p:nvPr/>
+        </p:nvSpPr>
+        <p:spPr>
+          <a:xfrm>
+            <a:off x="2705100" y="6553200"/>
+            <a:ext cx="3657600" cy="276999"/>
+          </a:xfrm>
+          <a:prstGeom prst="rect">
+            <a:avLst/>
+          </a:prstGeom>
+          <a:noFill/>
+        </p:spPr>
+        <p:txBody>
+          <a:bodyPr wrap="square" rtlCol="0">
+            <a:spAutoFit/>
+          </a:bodyPr>
+          <a:lstStyle/>
+          <a:p>
+            <a:pPr algn="ctr"/>
+            <a:r>
+              <a:rPr lang="en-US" sz="1200" b="1" dirty="0"/>
+              <a:t>Figure </a:t>
+            </a:r>
+            <a:r>
+              <a:rPr lang="en-US" sz="1200" b="1" dirty="0" smtClean="0"/>
+              <a:t>1-1. </a:t>
+            </a:r>
+            <a:r>
+              <a:rPr lang="en-US" sz="1200" b="1" dirty="0"/>
+              <a:t>Rascal Thermal Cycle Test </a:t>
+            </a:r>
+            <a:r>
+              <a:rPr lang="en-US" sz="1200" b="1" dirty="0" smtClean="0"/>
+              <a:t>Profile</a:t>
+            </a:r>
+            <a:endParaRPr lang="en-US" sz="1200" dirty="0"/>
+          </a:p>
+        </p:txBody>
+      </p:sp>
     </p:spTree>
     <p:extLst>
       <p:ext uri="{BB962C8B-B14F-4D97-AF65-F5344CB8AC3E}">
@@ -5259,8 +5302,8 @@
         </p:blipFill>
         <p:spPr bwMode="auto">
           <a:xfrm>
-            <a:off x="6166282" y="2971800"/>
-            <a:ext cx="2667001" cy="2985770"/>
+            <a:off x="5519690" y="2971800"/>
+            <a:ext cx="2938509" cy="3352800"/>
           </a:xfrm>
           <a:prstGeom prst="rect">
             <a:avLst/>
@@ -5276,6 +5319,41 @@
           </a:ln>
         </p:spPr>
       </p:pic>
+      <p:sp>
+        <p:nvSpPr>
+          <p:cNvPr id="3" name="TextBox 2"/>
+          <p:cNvSpPr txBox="1"/>
+          <p:nvPr/>
+        </p:nvSpPr>
+        <p:spPr>
+          <a:xfrm>
+            <a:off x="5350644" y="6437790"/>
+            <a:ext cx="3276600" cy="276999"/>
+          </a:xfrm>
+          <a:prstGeom prst="rect">
+            <a:avLst/>
+          </a:prstGeom>
+          <a:noFill/>
+        </p:spPr>
+        <p:txBody>
+          <a:bodyPr wrap="square" rtlCol="0">
+            <a:spAutoFit/>
+          </a:bodyPr>
+          <a:lstStyle/>
+          <a:p>
+            <a:pPr algn="ctr"/>
+            <a:r>
+              <a:rPr lang="en-US" sz="1200" b="1" dirty="0"/>
+              <a:t>Figure 1-3. NASA GEVS Random Vibration </a:t>
+            </a:r>
+            <a:r>
+              <a:rPr lang="en-US" sz="1200" b="1" dirty="0" smtClean="0"/>
+              <a:t>Profile</a:t>
+            </a:r>
+            <a:endParaRPr lang="en-US" sz="1200" dirty="0"/>
+          </a:p>
+        </p:txBody>
+      </p:sp>
     </p:spTree>
     <p:extLst>
       <p:ext uri="{BB962C8B-B14F-4D97-AF65-F5344CB8AC3E}">
@@ -6340,7 +6418,6 @@
               <a:rPr lang="en-US" sz="2400" dirty="0"/>
               <a:t>The requirement needs to be met so the CubeSat system can perform functional tests.</a:t>
             </a:r>
-            <a:endParaRPr lang="en-US" sz="2400" dirty="0"/>
           </a:p>
         </p:txBody>
       </p:sp>
@@ -6874,7 +6951,6 @@
               <a:rPr lang="en-US" sz="2400" dirty="0"/>
               <a:t>confidence in the reliability of the Rascal communication system prior to launch.</a:t>
             </a:r>
-            <a:endParaRPr lang="en-US" sz="2400" dirty="0"/>
           </a:p>
         </p:txBody>
       </p:sp>
@@ -7412,7 +7488,6 @@
               <a:rPr lang="en-US" sz="2400" dirty="0"/>
               <a:t>subsystem in the CubeSat system must successfully execute any on-orbit command that could potentially be sent to it, as well as demonstrate key on-orbit operations.</a:t>
             </a:r>
-            <a:endParaRPr lang="en-US" sz="2400" dirty="0"/>
           </a:p>
         </p:txBody>
       </p:sp>

</xml_diff>